<commit_message>
Removed Liberation font, added timer cursor
</commit_message>
<xml_diff>
--- a/Terraformini.pptx
+++ b/Terraformini.pptx
@@ -5,13 +5,17 @@
     <p:sldMasterId id="2147483684" r:id="rId1"/>
   </p:sldMasterIdLst>
   <p:sldIdLst>
-    <p:sldId id="262" r:id="rId2"/>
-    <p:sldId id="256" r:id="rId3"/>
-    <p:sldId id="257" r:id="rId4"/>
-    <p:sldId id="260" r:id="rId5"/>
-    <p:sldId id="258" r:id="rId6"/>
-    <p:sldId id="259" r:id="rId7"/>
-    <p:sldId id="261" r:id="rId8"/>
+    <p:sldId id="263" r:id="rId2"/>
+    <p:sldId id="264" r:id="rId3"/>
+    <p:sldId id="265" r:id="rId4"/>
+    <p:sldId id="266" r:id="rId5"/>
+    <p:sldId id="262" r:id="rId6"/>
+    <p:sldId id="256" r:id="rId7"/>
+    <p:sldId id="257" r:id="rId8"/>
+    <p:sldId id="260" r:id="rId9"/>
+    <p:sldId id="258" r:id="rId10"/>
+    <p:sldId id="259" r:id="rId11"/>
+    <p:sldId id="261" r:id="rId12"/>
   </p:sldIdLst>
   <p:sldSz cx="2879725" cy="2879725"/>
   <p:notesSz cx="6858000" cy="9144000"/>
@@ -112,7 +116,18 @@
   </p:defaultTextStyle>
   <p:extLst>
     <p:ext uri="{EFAFB233-063F-42B5-8137-9DF3F51BA10A}">
-      <p15:sldGuideLst xmlns:p15="http://schemas.microsoft.com/office/powerpoint/2012/main"/>
+      <p15:sldGuideLst xmlns:p15="http://schemas.microsoft.com/office/powerpoint/2012/main">
+        <p15:guide id="1" orient="horz" pos="907" userDrawn="1">
+          <p15:clr>
+            <a:srgbClr val="A4A3A4"/>
+          </p15:clr>
+        </p15:guide>
+        <p15:guide id="2" pos="907" userDrawn="1">
+          <p15:clr>
+            <a:srgbClr val="A4A3A4"/>
+          </p15:clr>
+        </p15:guide>
+      </p15:sldGuideLst>
     </p:ext>
   </p:extLst>
 </p:presentation>
@@ -249,7 +264,7 @@
           <a:p>
             <a:fld id="{C8E1FAC8-839D-4178-9E36-275898F012E0}" type="datetimeFigureOut">
               <a:rPr lang="en-US" smtClean="0"/>
-              <a:t>10/1/2021</a:t>
+              <a:t>10/7/2021</a:t>
             </a:fld>
             <a:endParaRPr lang="en-US"/>
           </a:p>
@@ -419,7 +434,7 @@
           <a:p>
             <a:fld id="{C8E1FAC8-839D-4178-9E36-275898F012E0}" type="datetimeFigureOut">
               <a:rPr lang="en-US" smtClean="0"/>
-              <a:t>10/1/2021</a:t>
+              <a:t>10/7/2021</a:t>
             </a:fld>
             <a:endParaRPr lang="en-US"/>
           </a:p>
@@ -599,7 +614,7 @@
           <a:p>
             <a:fld id="{C8E1FAC8-839D-4178-9E36-275898F012E0}" type="datetimeFigureOut">
               <a:rPr lang="en-US" smtClean="0"/>
-              <a:t>10/1/2021</a:t>
+              <a:t>10/7/2021</a:t>
             </a:fld>
             <a:endParaRPr lang="en-US"/>
           </a:p>
@@ -769,7 +784,7 @@
           <a:p>
             <a:fld id="{C8E1FAC8-839D-4178-9E36-275898F012E0}" type="datetimeFigureOut">
               <a:rPr lang="en-US" smtClean="0"/>
-              <a:t>10/1/2021</a:t>
+              <a:t>10/7/2021</a:t>
             </a:fld>
             <a:endParaRPr lang="en-US"/>
           </a:p>
@@ -1013,7 +1028,7 @@
           <a:p>
             <a:fld id="{C8E1FAC8-839D-4178-9E36-275898F012E0}" type="datetimeFigureOut">
               <a:rPr lang="en-US" smtClean="0"/>
-              <a:t>10/1/2021</a:t>
+              <a:t>10/7/2021</a:t>
             </a:fld>
             <a:endParaRPr lang="en-US"/>
           </a:p>
@@ -1245,7 +1260,7 @@
           <a:p>
             <a:fld id="{C8E1FAC8-839D-4178-9E36-275898F012E0}" type="datetimeFigureOut">
               <a:rPr lang="en-US" smtClean="0"/>
-              <a:t>10/1/2021</a:t>
+              <a:t>10/7/2021</a:t>
             </a:fld>
             <a:endParaRPr lang="en-US"/>
           </a:p>
@@ -1612,7 +1627,7 @@
           <a:p>
             <a:fld id="{C8E1FAC8-839D-4178-9E36-275898F012E0}" type="datetimeFigureOut">
               <a:rPr lang="en-US" smtClean="0"/>
-              <a:t>10/1/2021</a:t>
+              <a:t>10/7/2021</a:t>
             </a:fld>
             <a:endParaRPr lang="en-US"/>
           </a:p>
@@ -1730,7 +1745,7 @@
           <a:p>
             <a:fld id="{C8E1FAC8-839D-4178-9E36-275898F012E0}" type="datetimeFigureOut">
               <a:rPr lang="en-US" smtClean="0"/>
-              <a:t>10/1/2021</a:t>
+              <a:t>10/7/2021</a:t>
             </a:fld>
             <a:endParaRPr lang="en-US"/>
           </a:p>
@@ -1825,7 +1840,7 @@
           <a:p>
             <a:fld id="{C8E1FAC8-839D-4178-9E36-275898F012E0}" type="datetimeFigureOut">
               <a:rPr lang="en-US" smtClean="0"/>
-              <a:t>10/1/2021</a:t>
+              <a:t>10/7/2021</a:t>
             </a:fld>
             <a:endParaRPr lang="en-US"/>
           </a:p>
@@ -2102,7 +2117,7 @@
           <a:p>
             <a:fld id="{C8E1FAC8-839D-4178-9E36-275898F012E0}" type="datetimeFigureOut">
               <a:rPr lang="en-US" smtClean="0"/>
-              <a:t>10/1/2021</a:t>
+              <a:t>10/7/2021</a:t>
             </a:fld>
             <a:endParaRPr lang="en-US"/>
           </a:p>
@@ -2359,7 +2374,7 @@
           <a:p>
             <a:fld id="{C8E1FAC8-839D-4178-9E36-275898F012E0}" type="datetimeFigureOut">
               <a:rPr lang="en-US" smtClean="0"/>
-              <a:t>10/1/2021</a:t>
+              <a:t>10/7/2021</a:t>
             </a:fld>
             <a:endParaRPr lang="en-US"/>
           </a:p>
@@ -2572,7 +2587,7 @@
           <a:p>
             <a:fld id="{C8E1FAC8-839D-4178-9E36-275898F012E0}" type="datetimeFigureOut">
               <a:rPr lang="en-US" smtClean="0"/>
-              <a:t>10/1/2021</a:t>
+              <a:t>10/7/2021</a:t>
             </a:fld>
             <a:endParaRPr lang="en-US"/>
           </a:p>
@@ -2963,6 +2978,2940 @@
 <file path=ppt/slides/slide1.xml><?xml version="1.0" encoding="utf-8"?>
 <p:sld xmlns:a="http://schemas.openxmlformats.org/drawingml/2006/main" xmlns:r="http://schemas.openxmlformats.org/officeDocument/2006/relationships" xmlns:p="http://schemas.openxmlformats.org/presentationml/2006/main">
   <p:cSld>
+    <p:spTree>
+      <p:nvGrpSpPr>
+        <p:cNvPr id="1" name=""/>
+        <p:cNvGrpSpPr/>
+        <p:nvPr/>
+      </p:nvGrpSpPr>
+      <p:grpSpPr>
+        <a:xfrm>
+          <a:off x="0" y="0"/>
+          <a:ext cx="0" cy="0"/>
+          <a:chOff x="0" y="0"/>
+          <a:chExt cx="0" cy="0"/>
+        </a:xfrm>
+      </p:grpSpPr>
+      <p:grpSp>
+        <p:nvGrpSpPr>
+          <p:cNvPr id="11" name="Group 10">
+            <a:extLst>
+              <a:ext uri="{FF2B5EF4-FFF2-40B4-BE49-F238E27FC236}">
+                <a16:creationId xmlns:a16="http://schemas.microsoft.com/office/drawing/2014/main" id="{316DAA99-4B34-41D7-81E7-BD587B688A1A}"/>
+              </a:ext>
+            </a:extLst>
+          </p:cNvPr>
+          <p:cNvGrpSpPr/>
+          <p:nvPr/>
+        </p:nvGrpSpPr>
+        <p:grpSpPr>
+          <a:xfrm>
+            <a:off x="-1" y="297114"/>
+            <a:ext cx="2879726" cy="2285496"/>
+            <a:chOff x="-1" y="297114"/>
+            <a:chExt cx="2879726" cy="2285496"/>
+          </a:xfrm>
+        </p:grpSpPr>
+        <p:pic>
+          <p:nvPicPr>
+            <p:cNvPr id="7" name="Picture 6">
+              <a:extLst>
+                <a:ext uri="{FF2B5EF4-FFF2-40B4-BE49-F238E27FC236}">
+                  <a16:creationId xmlns:a16="http://schemas.microsoft.com/office/drawing/2014/main" id="{36746F28-B0BF-4331-9FDF-0258E2F6A853}"/>
+                </a:ext>
+              </a:extLst>
+            </p:cNvPr>
+            <p:cNvPicPr>
+              <a:picLocks noChangeAspect="1"/>
+            </p:cNvPicPr>
+            <p:nvPr/>
+          </p:nvPicPr>
+          <p:blipFill>
+            <a:blip r:embed="rId2"/>
+            <a:stretch>
+              <a:fillRect/>
+            </a:stretch>
+          </p:blipFill>
+          <p:spPr>
+            <a:xfrm>
+              <a:off x="0" y="297114"/>
+              <a:ext cx="2879725" cy="2285496"/>
+            </a:xfrm>
+            <a:prstGeom prst="rect">
+              <a:avLst/>
+            </a:prstGeom>
+          </p:spPr>
+        </p:pic>
+        <p:sp>
+          <p:nvSpPr>
+            <p:cNvPr id="8" name="TextBox 7">
+              <a:extLst>
+                <a:ext uri="{FF2B5EF4-FFF2-40B4-BE49-F238E27FC236}">
+                  <a16:creationId xmlns:a16="http://schemas.microsoft.com/office/drawing/2014/main" id="{41A8AF33-9D85-4B02-91D2-ACADC32A412C}"/>
+                </a:ext>
+              </a:extLst>
+            </p:cNvPr>
+            <p:cNvSpPr txBox="1"/>
+            <p:nvPr/>
+          </p:nvSpPr>
+          <p:spPr>
+            <a:xfrm>
+              <a:off x="0" y="1055141"/>
+              <a:ext cx="2879725" cy="769441"/>
+            </a:xfrm>
+            <a:prstGeom prst="rect">
+              <a:avLst/>
+            </a:prstGeom>
+            <a:noFill/>
+          </p:spPr>
+          <p:txBody>
+            <a:bodyPr wrap="square" rtlCol="0">
+              <a:spAutoFit/>
+            </a:bodyPr>
+            <a:lstStyle/>
+            <a:p>
+              <a:pPr algn="ctr"/>
+              <a:r>
+                <a:rPr lang="en-US" sz="4400" dirty="0">
+                  <a:ln w="38100">
+                    <a:solidFill>
+                      <a:schemeClr val="tx1">
+                        <a:lumMod val="85000"/>
+                        <a:lumOff val="15000"/>
+                      </a:schemeClr>
+                    </a:solidFill>
+                  </a:ln>
+                  <a:solidFill>
+                    <a:schemeClr val="bg1"/>
+                  </a:solidFill>
+                  <a:latin typeface="Lobster" panose="00000500000000000000" pitchFamily="50" charset="0"/>
+                </a:rPr>
+                <a:t>Environmini</a:t>
+              </a:r>
+            </a:p>
+          </p:txBody>
+        </p:sp>
+        <p:sp>
+          <p:nvSpPr>
+            <p:cNvPr id="10" name="TextBox 9">
+              <a:extLst>
+                <a:ext uri="{FF2B5EF4-FFF2-40B4-BE49-F238E27FC236}">
+                  <a16:creationId xmlns:a16="http://schemas.microsoft.com/office/drawing/2014/main" id="{CF1A2AD2-0D80-458B-B293-3787E0E96962}"/>
+                </a:ext>
+              </a:extLst>
+            </p:cNvPr>
+            <p:cNvSpPr txBox="1"/>
+            <p:nvPr/>
+          </p:nvSpPr>
+          <p:spPr>
+            <a:xfrm>
+              <a:off x="-1" y="1055141"/>
+              <a:ext cx="2879725" cy="769441"/>
+            </a:xfrm>
+            <a:prstGeom prst="rect">
+              <a:avLst/>
+            </a:prstGeom>
+            <a:noFill/>
+          </p:spPr>
+          <p:txBody>
+            <a:bodyPr wrap="square" rtlCol="0">
+              <a:spAutoFit/>
+            </a:bodyPr>
+            <a:lstStyle/>
+            <a:p>
+              <a:pPr algn="ctr"/>
+              <a:r>
+                <a:rPr lang="en-US" sz="4400" dirty="0">
+                  <a:solidFill>
+                    <a:schemeClr val="bg1"/>
+                  </a:solidFill>
+                  <a:latin typeface="Lobster" panose="00000500000000000000" pitchFamily="50" charset="0"/>
+                </a:rPr>
+                <a:t>Environmini</a:t>
+              </a:r>
+            </a:p>
+          </p:txBody>
+        </p:sp>
+      </p:grpSp>
+    </p:spTree>
+    <p:extLst>
+      <p:ext uri="{BB962C8B-B14F-4D97-AF65-F5344CB8AC3E}">
+        <p14:creationId xmlns:p14="http://schemas.microsoft.com/office/powerpoint/2010/main" val="2684950087"/>
+      </p:ext>
+    </p:extLst>
+  </p:cSld>
+  <p:clrMapOvr>
+    <a:masterClrMapping/>
+  </p:clrMapOvr>
+</p:sld>
+</file>
+
+<file path=ppt/slides/slide10.xml><?xml version="1.0" encoding="utf-8"?>
+<p:sld xmlns:a="http://schemas.openxmlformats.org/drawingml/2006/main" xmlns:r="http://schemas.openxmlformats.org/officeDocument/2006/relationships" xmlns:p="http://schemas.openxmlformats.org/presentationml/2006/main">
+  <p:cSld>
+    <p:bg>
+      <p:bgPr>
+        <a:solidFill>
+          <a:schemeClr val="tx1">
+            <a:alpha val="0"/>
+          </a:schemeClr>
+        </a:solidFill>
+        <a:effectLst/>
+      </p:bgPr>
+    </p:bg>
+    <p:spTree>
+      <p:nvGrpSpPr>
+        <p:cNvPr id="1" name=""/>
+        <p:cNvGrpSpPr/>
+        <p:nvPr/>
+      </p:nvGrpSpPr>
+      <p:grpSpPr>
+        <a:xfrm>
+          <a:off x="0" y="0"/>
+          <a:ext cx="0" cy="0"/>
+          <a:chOff x="0" y="0"/>
+          <a:chExt cx="0" cy="0"/>
+        </a:xfrm>
+      </p:grpSpPr>
+      <p:grpSp>
+        <p:nvGrpSpPr>
+          <p:cNvPr id="8" name="Group 7">
+            <a:extLst>
+              <a:ext uri="{FF2B5EF4-FFF2-40B4-BE49-F238E27FC236}">
+                <a16:creationId xmlns:a16="http://schemas.microsoft.com/office/drawing/2014/main" id="{378C68F5-E51C-433C-BFFC-351DD7D6E706}"/>
+              </a:ext>
+            </a:extLst>
+          </p:cNvPr>
+          <p:cNvGrpSpPr/>
+          <p:nvPr/>
+        </p:nvGrpSpPr>
+        <p:grpSpPr>
+          <a:xfrm>
+            <a:off x="528236" y="829072"/>
+            <a:ext cx="1823250" cy="1221580"/>
+            <a:chOff x="528236" y="829072"/>
+            <a:chExt cx="1823250" cy="1221580"/>
+          </a:xfrm>
+        </p:grpSpPr>
+        <p:sp>
+          <p:nvSpPr>
+            <p:cNvPr id="3" name="Flowchart: Decision 2">
+              <a:extLst>
+                <a:ext uri="{FF2B5EF4-FFF2-40B4-BE49-F238E27FC236}">
+                  <a16:creationId xmlns:a16="http://schemas.microsoft.com/office/drawing/2014/main" id="{5BAD1E78-63E0-4977-8F17-A4791A6841AC}"/>
+                </a:ext>
+              </a:extLst>
+            </p:cNvPr>
+            <p:cNvSpPr/>
+            <p:nvPr/>
+          </p:nvSpPr>
+          <p:spPr>
+            <a:xfrm>
+              <a:off x="1439861" y="1439863"/>
+              <a:ext cx="911625" cy="610789"/>
+            </a:xfrm>
+            <a:prstGeom prst="flowChartDecision">
+              <a:avLst/>
+            </a:prstGeom>
+            <a:noFill/>
+            <a:ln>
+              <a:solidFill>
+                <a:schemeClr val="bg1">
+                  <a:lumMod val="95000"/>
+                </a:schemeClr>
+              </a:solidFill>
+            </a:ln>
+          </p:spPr>
+          <p:style>
+            <a:lnRef idx="2">
+              <a:schemeClr val="accent1">
+                <a:shade val="50000"/>
+              </a:schemeClr>
+            </a:lnRef>
+            <a:fillRef idx="1">
+              <a:schemeClr val="accent1"/>
+            </a:fillRef>
+            <a:effectRef idx="0">
+              <a:schemeClr val="accent1"/>
+            </a:effectRef>
+            <a:fontRef idx="minor">
+              <a:schemeClr val="lt1"/>
+            </a:fontRef>
+          </p:style>
+          <p:txBody>
+            <a:bodyPr rtlCol="0" anchor="t"/>
+            <a:lstStyle/>
+            <a:p>
+              <a:pPr algn="ctr"/>
+              <a:r>
+                <a:rPr lang="en-US" sz="2239" dirty="0">
+                  <a:solidFill>
+                    <a:schemeClr val="bg1">
+                      <a:lumMod val="95000"/>
+                    </a:schemeClr>
+                  </a:solidFill>
+                  <a:latin typeface="Lobster" panose="00000500000000000000" pitchFamily="50" charset="0"/>
+                </a:rPr>
+                <a:t>1</a:t>
+              </a:r>
+            </a:p>
+          </p:txBody>
+        </p:sp>
+        <p:sp>
+          <p:nvSpPr>
+            <p:cNvPr id="5" name="Flowchart: Decision 4">
+              <a:extLst>
+                <a:ext uri="{FF2B5EF4-FFF2-40B4-BE49-F238E27FC236}">
+                  <a16:creationId xmlns:a16="http://schemas.microsoft.com/office/drawing/2014/main" id="{B3970CEB-F703-423F-8C89-9AB17D04CD98}"/>
+                </a:ext>
+              </a:extLst>
+            </p:cNvPr>
+            <p:cNvSpPr/>
+            <p:nvPr/>
+          </p:nvSpPr>
+          <p:spPr>
+            <a:xfrm>
+              <a:off x="984048" y="1138894"/>
+              <a:ext cx="911625" cy="610789"/>
+            </a:xfrm>
+            <a:prstGeom prst="flowChartDecision">
+              <a:avLst/>
+            </a:prstGeom>
+            <a:noFill/>
+            <a:ln>
+              <a:solidFill>
+                <a:schemeClr val="bg1">
+                  <a:lumMod val="95000"/>
+                </a:schemeClr>
+              </a:solidFill>
+            </a:ln>
+          </p:spPr>
+          <p:style>
+            <a:lnRef idx="2">
+              <a:schemeClr val="accent1">
+                <a:shade val="50000"/>
+              </a:schemeClr>
+            </a:lnRef>
+            <a:fillRef idx="1">
+              <a:schemeClr val="accent1"/>
+            </a:fillRef>
+            <a:effectRef idx="0">
+              <a:schemeClr val="accent1"/>
+            </a:effectRef>
+            <a:fontRef idx="minor">
+              <a:schemeClr val="lt1"/>
+            </a:fontRef>
+          </p:style>
+          <p:txBody>
+            <a:bodyPr rtlCol="0" anchor="t"/>
+            <a:lstStyle/>
+            <a:p>
+              <a:pPr algn="ctr"/>
+              <a:r>
+                <a:rPr lang="en-US" sz="2239" dirty="0">
+                  <a:solidFill>
+                    <a:schemeClr val="bg1">
+                      <a:lumMod val="95000"/>
+                    </a:schemeClr>
+                  </a:solidFill>
+                  <a:latin typeface="Lobster" panose="00000500000000000000" pitchFamily="50" charset="0"/>
+                </a:rPr>
+                <a:t>2</a:t>
+              </a:r>
+            </a:p>
+          </p:txBody>
+        </p:sp>
+        <p:sp>
+          <p:nvSpPr>
+            <p:cNvPr id="7" name="Flowchart: Decision 6">
+              <a:extLst>
+                <a:ext uri="{FF2B5EF4-FFF2-40B4-BE49-F238E27FC236}">
+                  <a16:creationId xmlns:a16="http://schemas.microsoft.com/office/drawing/2014/main" id="{440E7DE8-FB3D-4DD7-92CC-3E17CC85C084}"/>
+                </a:ext>
+              </a:extLst>
+            </p:cNvPr>
+            <p:cNvSpPr/>
+            <p:nvPr/>
+          </p:nvSpPr>
+          <p:spPr>
+            <a:xfrm>
+              <a:off x="528236" y="829072"/>
+              <a:ext cx="911625" cy="610789"/>
+            </a:xfrm>
+            <a:prstGeom prst="flowChartDecision">
+              <a:avLst/>
+            </a:prstGeom>
+            <a:solidFill>
+              <a:schemeClr val="bg1">
+                <a:lumMod val="95000"/>
+              </a:schemeClr>
+            </a:solidFill>
+            <a:ln>
+              <a:solidFill>
+                <a:schemeClr val="bg1">
+                  <a:lumMod val="95000"/>
+                </a:schemeClr>
+              </a:solidFill>
+            </a:ln>
+          </p:spPr>
+          <p:style>
+            <a:lnRef idx="2">
+              <a:schemeClr val="accent1">
+                <a:shade val="50000"/>
+              </a:schemeClr>
+            </a:lnRef>
+            <a:fillRef idx="1">
+              <a:schemeClr val="accent1"/>
+            </a:fillRef>
+            <a:effectRef idx="0">
+              <a:schemeClr val="accent1"/>
+            </a:effectRef>
+            <a:fontRef idx="minor">
+              <a:schemeClr val="lt1"/>
+            </a:fontRef>
+          </p:style>
+          <p:txBody>
+            <a:bodyPr rtlCol="0" anchor="t"/>
+            <a:lstStyle/>
+            <a:p>
+              <a:pPr algn="ctr"/>
+              <a:r>
+                <a:rPr lang="en-US" sz="2239" dirty="0">
+                  <a:solidFill>
+                    <a:schemeClr val="tx1"/>
+                  </a:solidFill>
+                  <a:latin typeface="Lobster" panose="00000500000000000000" pitchFamily="50" charset="0"/>
+                </a:rPr>
+                <a:t>3</a:t>
+              </a:r>
+            </a:p>
+          </p:txBody>
+        </p:sp>
+      </p:grpSp>
+    </p:spTree>
+    <p:extLst>
+      <p:ext uri="{BB962C8B-B14F-4D97-AF65-F5344CB8AC3E}">
+        <p14:creationId xmlns:p14="http://schemas.microsoft.com/office/powerpoint/2010/main" val="3802208767"/>
+      </p:ext>
+    </p:extLst>
+  </p:cSld>
+  <p:clrMapOvr>
+    <a:masterClrMapping/>
+  </p:clrMapOvr>
+</p:sld>
+</file>
+
+<file path=ppt/slides/slide11.xml><?xml version="1.0" encoding="utf-8"?>
+<p:sld xmlns:a="http://schemas.openxmlformats.org/drawingml/2006/main" xmlns:r="http://schemas.openxmlformats.org/officeDocument/2006/relationships" xmlns:p="http://schemas.openxmlformats.org/presentationml/2006/main">
+  <p:cSld>
+    <p:bg>
+      <p:bgPr>
+        <a:solidFill>
+          <a:schemeClr val="tx1">
+            <a:alpha val="0"/>
+          </a:schemeClr>
+        </a:solidFill>
+        <a:effectLst/>
+      </p:bgPr>
+    </p:bg>
+    <p:spTree>
+      <p:nvGrpSpPr>
+        <p:cNvPr id="1" name=""/>
+        <p:cNvGrpSpPr/>
+        <p:nvPr/>
+      </p:nvGrpSpPr>
+      <p:grpSpPr>
+        <a:xfrm>
+          <a:off x="0" y="0"/>
+          <a:ext cx="0" cy="0"/>
+          <a:chOff x="0" y="0"/>
+          <a:chExt cx="0" cy="0"/>
+        </a:xfrm>
+      </p:grpSpPr>
+      <p:grpSp>
+        <p:nvGrpSpPr>
+          <p:cNvPr id="8" name="Group 7">
+            <a:extLst>
+              <a:ext uri="{FF2B5EF4-FFF2-40B4-BE49-F238E27FC236}">
+                <a16:creationId xmlns:a16="http://schemas.microsoft.com/office/drawing/2014/main" id="{378C68F5-E51C-433C-BFFC-351DD7D6E706}"/>
+              </a:ext>
+            </a:extLst>
+          </p:cNvPr>
+          <p:cNvGrpSpPr/>
+          <p:nvPr/>
+        </p:nvGrpSpPr>
+        <p:grpSpPr>
+          <a:xfrm>
+            <a:off x="528235" y="833499"/>
+            <a:ext cx="1823251" cy="1217153"/>
+            <a:chOff x="528235" y="833499"/>
+            <a:chExt cx="1823251" cy="1217153"/>
+          </a:xfrm>
+        </p:grpSpPr>
+        <p:sp>
+          <p:nvSpPr>
+            <p:cNvPr id="3" name="Flowchart: Decision 2">
+              <a:extLst>
+                <a:ext uri="{FF2B5EF4-FFF2-40B4-BE49-F238E27FC236}">
+                  <a16:creationId xmlns:a16="http://schemas.microsoft.com/office/drawing/2014/main" id="{5BAD1E78-63E0-4977-8F17-A4791A6841AC}"/>
+                </a:ext>
+              </a:extLst>
+            </p:cNvPr>
+            <p:cNvSpPr/>
+            <p:nvPr/>
+          </p:nvSpPr>
+          <p:spPr>
+            <a:xfrm>
+              <a:off x="1439861" y="833499"/>
+              <a:ext cx="911625" cy="610789"/>
+            </a:xfrm>
+            <a:prstGeom prst="flowChartDecision">
+              <a:avLst/>
+            </a:prstGeom>
+            <a:noFill/>
+            <a:ln>
+              <a:solidFill>
+                <a:schemeClr val="bg1">
+                  <a:lumMod val="95000"/>
+                </a:schemeClr>
+              </a:solidFill>
+            </a:ln>
+          </p:spPr>
+          <p:style>
+            <a:lnRef idx="2">
+              <a:schemeClr val="accent1">
+                <a:shade val="50000"/>
+              </a:schemeClr>
+            </a:lnRef>
+            <a:fillRef idx="1">
+              <a:schemeClr val="accent1"/>
+            </a:fillRef>
+            <a:effectRef idx="0">
+              <a:schemeClr val="accent1"/>
+            </a:effectRef>
+            <a:fontRef idx="minor">
+              <a:schemeClr val="lt1"/>
+            </a:fontRef>
+          </p:style>
+          <p:txBody>
+            <a:bodyPr rtlCol="0" anchor="t"/>
+            <a:lstStyle/>
+            <a:p>
+              <a:pPr algn="ctr"/>
+              <a:r>
+                <a:rPr lang="en-US" sz="2239" dirty="0">
+                  <a:solidFill>
+                    <a:schemeClr val="bg1">
+                      <a:lumMod val="95000"/>
+                    </a:schemeClr>
+                  </a:solidFill>
+                  <a:latin typeface="Lobster" panose="00000500000000000000" pitchFamily="50" charset="0"/>
+                </a:rPr>
+                <a:t>1</a:t>
+              </a:r>
+            </a:p>
+          </p:txBody>
+        </p:sp>
+        <p:sp>
+          <p:nvSpPr>
+            <p:cNvPr id="5" name="Flowchart: Decision 4">
+              <a:extLst>
+                <a:ext uri="{FF2B5EF4-FFF2-40B4-BE49-F238E27FC236}">
+                  <a16:creationId xmlns:a16="http://schemas.microsoft.com/office/drawing/2014/main" id="{B3970CEB-F703-423F-8C89-9AB17D04CD98}"/>
+                </a:ext>
+              </a:extLst>
+            </p:cNvPr>
+            <p:cNvSpPr/>
+            <p:nvPr/>
+          </p:nvSpPr>
+          <p:spPr>
+            <a:xfrm>
+              <a:off x="984048" y="1138894"/>
+              <a:ext cx="911625" cy="610789"/>
+            </a:xfrm>
+            <a:prstGeom prst="flowChartDecision">
+              <a:avLst/>
+            </a:prstGeom>
+            <a:noFill/>
+            <a:ln>
+              <a:solidFill>
+                <a:schemeClr val="bg1">
+                  <a:lumMod val="95000"/>
+                </a:schemeClr>
+              </a:solidFill>
+            </a:ln>
+          </p:spPr>
+          <p:style>
+            <a:lnRef idx="2">
+              <a:schemeClr val="accent1">
+                <a:shade val="50000"/>
+              </a:schemeClr>
+            </a:lnRef>
+            <a:fillRef idx="1">
+              <a:schemeClr val="accent1"/>
+            </a:fillRef>
+            <a:effectRef idx="0">
+              <a:schemeClr val="accent1"/>
+            </a:effectRef>
+            <a:fontRef idx="minor">
+              <a:schemeClr val="lt1"/>
+            </a:fontRef>
+          </p:style>
+          <p:txBody>
+            <a:bodyPr rtlCol="0" anchor="t"/>
+            <a:lstStyle/>
+            <a:p>
+              <a:pPr algn="ctr"/>
+              <a:r>
+                <a:rPr lang="en-US" sz="2239" dirty="0">
+                  <a:solidFill>
+                    <a:schemeClr val="bg1">
+                      <a:lumMod val="95000"/>
+                    </a:schemeClr>
+                  </a:solidFill>
+                  <a:latin typeface="Lobster" panose="00000500000000000000" pitchFamily="50" charset="0"/>
+                </a:rPr>
+                <a:t>2</a:t>
+              </a:r>
+            </a:p>
+          </p:txBody>
+        </p:sp>
+        <p:sp>
+          <p:nvSpPr>
+            <p:cNvPr id="7" name="Flowchart: Decision 6">
+              <a:extLst>
+                <a:ext uri="{FF2B5EF4-FFF2-40B4-BE49-F238E27FC236}">
+                  <a16:creationId xmlns:a16="http://schemas.microsoft.com/office/drawing/2014/main" id="{440E7DE8-FB3D-4DD7-92CC-3E17CC85C084}"/>
+                </a:ext>
+              </a:extLst>
+            </p:cNvPr>
+            <p:cNvSpPr/>
+            <p:nvPr/>
+          </p:nvSpPr>
+          <p:spPr>
+            <a:xfrm>
+              <a:off x="528235" y="1439863"/>
+              <a:ext cx="911625" cy="610789"/>
+            </a:xfrm>
+            <a:prstGeom prst="flowChartDecision">
+              <a:avLst/>
+            </a:prstGeom>
+            <a:solidFill>
+              <a:schemeClr val="bg1">
+                <a:lumMod val="95000"/>
+              </a:schemeClr>
+            </a:solidFill>
+            <a:ln>
+              <a:solidFill>
+                <a:schemeClr val="bg1">
+                  <a:lumMod val="95000"/>
+                </a:schemeClr>
+              </a:solidFill>
+            </a:ln>
+          </p:spPr>
+          <p:style>
+            <a:lnRef idx="2">
+              <a:schemeClr val="accent1">
+                <a:shade val="50000"/>
+              </a:schemeClr>
+            </a:lnRef>
+            <a:fillRef idx="1">
+              <a:schemeClr val="accent1"/>
+            </a:fillRef>
+            <a:effectRef idx="0">
+              <a:schemeClr val="accent1"/>
+            </a:effectRef>
+            <a:fontRef idx="minor">
+              <a:schemeClr val="lt1"/>
+            </a:fontRef>
+          </p:style>
+          <p:txBody>
+            <a:bodyPr rtlCol="0" anchor="t"/>
+            <a:lstStyle/>
+            <a:p>
+              <a:pPr algn="ctr"/>
+              <a:r>
+                <a:rPr lang="en-US" sz="2239" dirty="0">
+                  <a:solidFill>
+                    <a:schemeClr val="tx1"/>
+                  </a:solidFill>
+                  <a:latin typeface="Lobster" panose="00000500000000000000" pitchFamily="50" charset="0"/>
+                </a:rPr>
+                <a:t>3</a:t>
+              </a:r>
+            </a:p>
+          </p:txBody>
+        </p:sp>
+      </p:grpSp>
+    </p:spTree>
+    <p:extLst>
+      <p:ext uri="{BB962C8B-B14F-4D97-AF65-F5344CB8AC3E}">
+        <p14:creationId xmlns:p14="http://schemas.microsoft.com/office/powerpoint/2010/main" val="2303702286"/>
+      </p:ext>
+    </p:extLst>
+  </p:cSld>
+  <p:clrMapOvr>
+    <a:masterClrMapping/>
+  </p:clrMapOvr>
+</p:sld>
+</file>
+
+<file path=ppt/slides/slide2.xml><?xml version="1.0" encoding="utf-8"?>
+<p:sld xmlns:a="http://schemas.openxmlformats.org/drawingml/2006/main" xmlns:r="http://schemas.openxmlformats.org/officeDocument/2006/relationships" xmlns:p="http://schemas.openxmlformats.org/presentationml/2006/main">
+  <p:cSld>
+    <p:spTree>
+      <p:nvGrpSpPr>
+        <p:cNvPr id="1" name=""/>
+        <p:cNvGrpSpPr/>
+        <p:nvPr/>
+      </p:nvGrpSpPr>
+      <p:grpSpPr>
+        <a:xfrm>
+          <a:off x="0" y="0"/>
+          <a:ext cx="0" cy="0"/>
+          <a:chOff x="0" y="0"/>
+          <a:chExt cx="0" cy="0"/>
+        </a:xfrm>
+      </p:grpSpPr>
+      <p:grpSp>
+        <p:nvGrpSpPr>
+          <p:cNvPr id="27" name="Group 26">
+            <a:extLst>
+              <a:ext uri="{FF2B5EF4-FFF2-40B4-BE49-F238E27FC236}">
+                <a16:creationId xmlns:a16="http://schemas.microsoft.com/office/drawing/2014/main" id="{471B36BD-C7B1-4317-AFD0-88FB07B82651}"/>
+              </a:ext>
+            </a:extLst>
+          </p:cNvPr>
+          <p:cNvGrpSpPr/>
+          <p:nvPr/>
+        </p:nvGrpSpPr>
+        <p:grpSpPr>
+          <a:xfrm>
+            <a:off x="494982" y="605039"/>
+            <a:ext cx="914400" cy="914400"/>
+            <a:chOff x="494982" y="605039"/>
+            <a:chExt cx="914400" cy="914400"/>
+          </a:xfrm>
+        </p:grpSpPr>
+        <p:sp>
+          <p:nvSpPr>
+            <p:cNvPr id="26" name="Freeform: Shape 25">
+              <a:extLst>
+                <a:ext uri="{FF2B5EF4-FFF2-40B4-BE49-F238E27FC236}">
+                  <a16:creationId xmlns:a16="http://schemas.microsoft.com/office/drawing/2014/main" id="{0F658E0D-85C2-4623-85E8-469F1F4E715E}"/>
+                </a:ext>
+              </a:extLst>
+            </p:cNvPr>
+            <p:cNvSpPr/>
+            <p:nvPr/>
+          </p:nvSpPr>
+          <p:spPr>
+            <a:xfrm>
+              <a:off x="765810" y="749819"/>
+              <a:ext cx="443865" cy="601980"/>
+            </a:xfrm>
+            <a:custGeom>
+              <a:avLst/>
+              <a:gdLst>
+                <a:gd name="connsiteX0" fmla="*/ 0 w 443865"/>
+                <a:gd name="connsiteY0" fmla="*/ 0 h 601980"/>
+                <a:gd name="connsiteX1" fmla="*/ 41910 w 443865"/>
+                <a:gd name="connsiteY1" fmla="*/ 527685 h 601980"/>
+                <a:gd name="connsiteX2" fmla="*/ 160020 w 443865"/>
+                <a:gd name="connsiteY2" fmla="*/ 367665 h 601980"/>
+                <a:gd name="connsiteX3" fmla="*/ 302895 w 443865"/>
+                <a:gd name="connsiteY3" fmla="*/ 601980 h 601980"/>
+                <a:gd name="connsiteX4" fmla="*/ 384810 w 443865"/>
+                <a:gd name="connsiteY4" fmla="*/ 548640 h 601980"/>
+                <a:gd name="connsiteX5" fmla="*/ 245745 w 443865"/>
+                <a:gd name="connsiteY5" fmla="*/ 312420 h 601980"/>
+                <a:gd name="connsiteX6" fmla="*/ 443865 w 443865"/>
+                <a:gd name="connsiteY6" fmla="*/ 285750 h 601980"/>
+                <a:gd name="connsiteX7" fmla="*/ 0 w 443865"/>
+                <a:gd name="connsiteY7" fmla="*/ 0 h 601980"/>
+              </a:gdLst>
+              <a:ahLst/>
+              <a:cxnLst>
+                <a:cxn ang="0">
+                  <a:pos x="connsiteX0" y="connsiteY0"/>
+                </a:cxn>
+                <a:cxn ang="0">
+                  <a:pos x="connsiteX1" y="connsiteY1"/>
+                </a:cxn>
+                <a:cxn ang="0">
+                  <a:pos x="connsiteX2" y="connsiteY2"/>
+                </a:cxn>
+                <a:cxn ang="0">
+                  <a:pos x="connsiteX3" y="connsiteY3"/>
+                </a:cxn>
+                <a:cxn ang="0">
+                  <a:pos x="connsiteX4" y="connsiteY4"/>
+                </a:cxn>
+                <a:cxn ang="0">
+                  <a:pos x="connsiteX5" y="connsiteY5"/>
+                </a:cxn>
+                <a:cxn ang="0">
+                  <a:pos x="connsiteX6" y="connsiteY6"/>
+                </a:cxn>
+                <a:cxn ang="0">
+                  <a:pos x="connsiteX7" y="connsiteY7"/>
+                </a:cxn>
+              </a:cxnLst>
+              <a:rect l="l" t="t" r="r" b="b"/>
+              <a:pathLst>
+                <a:path w="443865" h="601980">
+                  <a:moveTo>
+                    <a:pt x="0" y="0"/>
+                  </a:moveTo>
+                  <a:lnTo>
+                    <a:pt x="41910" y="527685"/>
+                  </a:lnTo>
+                  <a:lnTo>
+                    <a:pt x="160020" y="367665"/>
+                  </a:lnTo>
+                  <a:lnTo>
+                    <a:pt x="302895" y="601980"/>
+                  </a:lnTo>
+                  <a:lnTo>
+                    <a:pt x="384810" y="548640"/>
+                  </a:lnTo>
+                  <a:lnTo>
+                    <a:pt x="245745" y="312420"/>
+                  </a:lnTo>
+                  <a:lnTo>
+                    <a:pt x="443865" y="285750"/>
+                  </a:lnTo>
+                  <a:lnTo>
+                    <a:pt x="0" y="0"/>
+                  </a:lnTo>
+                  <a:close/>
+                </a:path>
+              </a:pathLst>
+            </a:custGeom>
+            <a:solidFill>
+              <a:schemeClr val="bg1"/>
+            </a:solidFill>
+            <a:ln>
+              <a:noFill/>
+            </a:ln>
+          </p:spPr>
+          <p:style>
+            <a:lnRef idx="2">
+              <a:schemeClr val="accent1">
+                <a:shade val="50000"/>
+              </a:schemeClr>
+            </a:lnRef>
+            <a:fillRef idx="1">
+              <a:schemeClr val="accent1"/>
+            </a:fillRef>
+            <a:effectRef idx="0">
+              <a:schemeClr val="accent1"/>
+            </a:effectRef>
+            <a:fontRef idx="minor">
+              <a:schemeClr val="lt1"/>
+            </a:fontRef>
+          </p:style>
+          <p:txBody>
+            <a:bodyPr rtlCol="0" anchor="ctr"/>
+            <a:lstStyle/>
+            <a:p>
+              <a:pPr algn="ctr"/>
+              <a:endParaRPr lang="en-US"/>
+            </a:p>
+          </p:txBody>
+        </p:sp>
+        <p:pic>
+          <p:nvPicPr>
+            <p:cNvPr id="9" name="Graphic 8" descr="Cursor outline">
+              <a:extLst>
+                <a:ext uri="{FF2B5EF4-FFF2-40B4-BE49-F238E27FC236}">
+                  <a16:creationId xmlns:a16="http://schemas.microsoft.com/office/drawing/2014/main" id="{D5A66568-1A31-4874-B21A-450CBF362896}"/>
+                </a:ext>
+              </a:extLst>
+            </p:cNvPr>
+            <p:cNvPicPr>
+              <a:picLocks noChangeAspect="1"/>
+            </p:cNvPicPr>
+            <p:nvPr/>
+          </p:nvPicPr>
+          <p:blipFill>
+            <a:blip r:embed="rId2">
+              <a:extLst>
+                <a:ext uri="{28A0092B-C50C-407E-A947-70E740481C1C}">
+                  <a14:useLocalDpi xmlns:a14="http://schemas.microsoft.com/office/drawing/2010/main" val="0"/>
+                </a:ext>
+                <a:ext uri="{96DAC541-7B7A-43D3-8B79-37D633B846F1}">
+                  <asvg:svgBlip xmlns:asvg="http://schemas.microsoft.com/office/drawing/2016/SVG/main" r:embed="rId3"/>
+                </a:ext>
+              </a:extLst>
+            </a:blip>
+            <a:stretch>
+              <a:fillRect/>
+            </a:stretch>
+          </p:blipFill>
+          <p:spPr>
+            <a:xfrm rot="842527">
+              <a:off x="494982" y="605039"/>
+              <a:ext cx="914400" cy="914400"/>
+            </a:xfrm>
+            <a:prstGeom prst="rect">
+              <a:avLst/>
+            </a:prstGeom>
+          </p:spPr>
+        </p:pic>
+      </p:grpSp>
+    </p:spTree>
+    <p:extLst>
+      <p:ext uri="{BB962C8B-B14F-4D97-AF65-F5344CB8AC3E}">
+        <p14:creationId xmlns:p14="http://schemas.microsoft.com/office/powerpoint/2010/main" val="1395185318"/>
+      </p:ext>
+    </p:extLst>
+  </p:cSld>
+  <p:clrMapOvr>
+    <a:masterClrMapping/>
+  </p:clrMapOvr>
+</p:sld>
+</file>
+
+<file path=ppt/slides/slide3.xml><?xml version="1.0" encoding="utf-8"?>
+<p:sld xmlns:a="http://schemas.openxmlformats.org/drawingml/2006/main" xmlns:r="http://schemas.openxmlformats.org/officeDocument/2006/relationships" xmlns:p="http://schemas.openxmlformats.org/presentationml/2006/main">
+  <p:cSld>
+    <p:spTree>
+      <p:nvGrpSpPr>
+        <p:cNvPr id="1" name=""/>
+        <p:cNvGrpSpPr/>
+        <p:nvPr/>
+      </p:nvGrpSpPr>
+      <p:grpSpPr>
+        <a:xfrm>
+          <a:off x="0" y="0"/>
+          <a:ext cx="0" cy="0"/>
+          <a:chOff x="0" y="0"/>
+          <a:chExt cx="0" cy="0"/>
+        </a:xfrm>
+      </p:grpSpPr>
+      <p:grpSp>
+        <p:nvGrpSpPr>
+          <p:cNvPr id="39" name="Group 38">
+            <a:extLst>
+              <a:ext uri="{FF2B5EF4-FFF2-40B4-BE49-F238E27FC236}">
+                <a16:creationId xmlns:a16="http://schemas.microsoft.com/office/drawing/2014/main" id="{69E7D3BA-92CC-4E8C-920A-E26FF9446CD9}"/>
+              </a:ext>
+            </a:extLst>
+          </p:cNvPr>
+          <p:cNvGrpSpPr/>
+          <p:nvPr/>
+        </p:nvGrpSpPr>
+        <p:grpSpPr>
+          <a:xfrm>
+            <a:off x="0" y="0"/>
+            <a:ext cx="2879725" cy="2860300"/>
+            <a:chOff x="0" y="0"/>
+            <a:chExt cx="2879725" cy="2860300"/>
+          </a:xfrm>
+        </p:grpSpPr>
+        <p:sp>
+          <p:nvSpPr>
+            <p:cNvPr id="27" name="Oval 26">
+              <a:extLst>
+                <a:ext uri="{FF2B5EF4-FFF2-40B4-BE49-F238E27FC236}">
+                  <a16:creationId xmlns:a16="http://schemas.microsoft.com/office/drawing/2014/main" id="{1BEBDE73-1827-41CE-9EE7-C1D90CC50302}"/>
+                </a:ext>
+              </a:extLst>
+            </p:cNvPr>
+            <p:cNvSpPr/>
+            <p:nvPr/>
+          </p:nvSpPr>
+          <p:spPr>
+            <a:xfrm>
+              <a:off x="146198" y="194045"/>
+              <a:ext cx="619346" cy="619346"/>
+            </a:xfrm>
+            <a:prstGeom prst="ellipse">
+              <a:avLst/>
+            </a:prstGeom>
+            <a:solidFill>
+              <a:schemeClr val="bg1"/>
+            </a:solidFill>
+            <a:ln>
+              <a:noFill/>
+            </a:ln>
+          </p:spPr>
+          <p:style>
+            <a:lnRef idx="2">
+              <a:schemeClr val="accent1">
+                <a:shade val="50000"/>
+              </a:schemeClr>
+            </a:lnRef>
+            <a:fillRef idx="1">
+              <a:schemeClr val="accent1"/>
+            </a:fillRef>
+            <a:effectRef idx="0">
+              <a:schemeClr val="accent1"/>
+            </a:effectRef>
+            <a:fontRef idx="minor">
+              <a:schemeClr val="lt1"/>
+            </a:fontRef>
+          </p:style>
+          <p:txBody>
+            <a:bodyPr rtlCol="0" anchor="ctr"/>
+            <a:lstStyle/>
+            <a:p>
+              <a:pPr algn="ctr"/>
+              <a:endParaRPr lang="en-US"/>
+            </a:p>
+          </p:txBody>
+        </p:sp>
+        <p:sp>
+          <p:nvSpPr>
+            <p:cNvPr id="28" name="Oval 27">
+              <a:extLst>
+                <a:ext uri="{FF2B5EF4-FFF2-40B4-BE49-F238E27FC236}">
+                  <a16:creationId xmlns:a16="http://schemas.microsoft.com/office/drawing/2014/main" id="{59576ACF-2D5E-4000-A314-125A240CE0EB}"/>
+                </a:ext>
+              </a:extLst>
+            </p:cNvPr>
+            <p:cNvSpPr/>
+            <p:nvPr/>
+          </p:nvSpPr>
+          <p:spPr>
+            <a:xfrm>
+              <a:off x="1130190" y="194045"/>
+              <a:ext cx="619346" cy="619346"/>
+            </a:xfrm>
+            <a:prstGeom prst="ellipse">
+              <a:avLst/>
+            </a:prstGeom>
+            <a:solidFill>
+              <a:schemeClr val="bg1"/>
+            </a:solidFill>
+            <a:ln>
+              <a:noFill/>
+            </a:ln>
+          </p:spPr>
+          <p:style>
+            <a:lnRef idx="2">
+              <a:schemeClr val="accent1">
+                <a:shade val="50000"/>
+              </a:schemeClr>
+            </a:lnRef>
+            <a:fillRef idx="1">
+              <a:schemeClr val="accent1"/>
+            </a:fillRef>
+            <a:effectRef idx="0">
+              <a:schemeClr val="accent1"/>
+            </a:effectRef>
+            <a:fontRef idx="minor">
+              <a:schemeClr val="lt1"/>
+            </a:fontRef>
+          </p:style>
+          <p:txBody>
+            <a:bodyPr rtlCol="0" anchor="ctr"/>
+            <a:lstStyle/>
+            <a:p>
+              <a:pPr algn="ctr"/>
+              <a:endParaRPr lang="en-US"/>
+            </a:p>
+          </p:txBody>
+        </p:sp>
+        <p:sp>
+          <p:nvSpPr>
+            <p:cNvPr id="29" name="Oval 28">
+              <a:extLst>
+                <a:ext uri="{FF2B5EF4-FFF2-40B4-BE49-F238E27FC236}">
+                  <a16:creationId xmlns:a16="http://schemas.microsoft.com/office/drawing/2014/main" id="{9B6ED136-142C-42F6-AA7E-949BA8AAAD73}"/>
+                </a:ext>
+              </a:extLst>
+            </p:cNvPr>
+            <p:cNvSpPr/>
+            <p:nvPr/>
+          </p:nvSpPr>
+          <p:spPr>
+            <a:xfrm>
+              <a:off x="2112852" y="194045"/>
+              <a:ext cx="619346" cy="619346"/>
+            </a:xfrm>
+            <a:prstGeom prst="ellipse">
+              <a:avLst/>
+            </a:prstGeom>
+            <a:solidFill>
+              <a:schemeClr val="bg1"/>
+            </a:solidFill>
+            <a:ln>
+              <a:noFill/>
+            </a:ln>
+          </p:spPr>
+          <p:style>
+            <a:lnRef idx="2">
+              <a:schemeClr val="accent1">
+                <a:shade val="50000"/>
+              </a:schemeClr>
+            </a:lnRef>
+            <a:fillRef idx="1">
+              <a:schemeClr val="accent1"/>
+            </a:fillRef>
+            <a:effectRef idx="0">
+              <a:schemeClr val="accent1"/>
+            </a:effectRef>
+            <a:fontRef idx="minor">
+              <a:schemeClr val="lt1"/>
+            </a:fontRef>
+          </p:style>
+          <p:txBody>
+            <a:bodyPr rtlCol="0" anchor="ctr"/>
+            <a:lstStyle/>
+            <a:p>
+              <a:pPr algn="ctr"/>
+              <a:endParaRPr lang="en-US"/>
+            </a:p>
+          </p:txBody>
+        </p:sp>
+        <p:sp>
+          <p:nvSpPr>
+            <p:cNvPr id="30" name="Oval 29">
+              <a:extLst>
+                <a:ext uri="{FF2B5EF4-FFF2-40B4-BE49-F238E27FC236}">
+                  <a16:creationId xmlns:a16="http://schemas.microsoft.com/office/drawing/2014/main" id="{7C71FA49-B870-41EB-A9A7-C5FEE0D4BD97}"/>
+                </a:ext>
+              </a:extLst>
+            </p:cNvPr>
+            <p:cNvSpPr/>
+            <p:nvPr/>
+          </p:nvSpPr>
+          <p:spPr>
+            <a:xfrm>
+              <a:off x="146198" y="1140821"/>
+              <a:ext cx="619346" cy="619346"/>
+            </a:xfrm>
+            <a:prstGeom prst="ellipse">
+              <a:avLst/>
+            </a:prstGeom>
+            <a:solidFill>
+              <a:schemeClr val="bg1"/>
+            </a:solidFill>
+            <a:ln>
+              <a:noFill/>
+            </a:ln>
+          </p:spPr>
+          <p:style>
+            <a:lnRef idx="2">
+              <a:schemeClr val="accent1">
+                <a:shade val="50000"/>
+              </a:schemeClr>
+            </a:lnRef>
+            <a:fillRef idx="1">
+              <a:schemeClr val="accent1"/>
+            </a:fillRef>
+            <a:effectRef idx="0">
+              <a:schemeClr val="accent1"/>
+            </a:effectRef>
+            <a:fontRef idx="minor">
+              <a:schemeClr val="lt1"/>
+            </a:fontRef>
+          </p:style>
+          <p:txBody>
+            <a:bodyPr rtlCol="0" anchor="ctr"/>
+            <a:lstStyle/>
+            <a:p>
+              <a:pPr algn="ctr"/>
+              <a:endParaRPr lang="en-US"/>
+            </a:p>
+          </p:txBody>
+        </p:sp>
+        <p:sp>
+          <p:nvSpPr>
+            <p:cNvPr id="31" name="Oval 30">
+              <a:extLst>
+                <a:ext uri="{FF2B5EF4-FFF2-40B4-BE49-F238E27FC236}">
+                  <a16:creationId xmlns:a16="http://schemas.microsoft.com/office/drawing/2014/main" id="{7A8C05BC-B0A2-406D-B418-4C3E066C542D}"/>
+                </a:ext>
+              </a:extLst>
+            </p:cNvPr>
+            <p:cNvSpPr/>
+            <p:nvPr/>
+          </p:nvSpPr>
+          <p:spPr>
+            <a:xfrm>
+              <a:off x="1130190" y="1140821"/>
+              <a:ext cx="619346" cy="619346"/>
+            </a:xfrm>
+            <a:prstGeom prst="ellipse">
+              <a:avLst/>
+            </a:prstGeom>
+            <a:solidFill>
+              <a:schemeClr val="bg1"/>
+            </a:solidFill>
+            <a:ln>
+              <a:noFill/>
+            </a:ln>
+          </p:spPr>
+          <p:style>
+            <a:lnRef idx="2">
+              <a:schemeClr val="accent1">
+                <a:shade val="50000"/>
+              </a:schemeClr>
+            </a:lnRef>
+            <a:fillRef idx="1">
+              <a:schemeClr val="accent1"/>
+            </a:fillRef>
+            <a:effectRef idx="0">
+              <a:schemeClr val="accent1"/>
+            </a:effectRef>
+            <a:fontRef idx="minor">
+              <a:schemeClr val="lt1"/>
+            </a:fontRef>
+          </p:style>
+          <p:txBody>
+            <a:bodyPr rtlCol="0" anchor="ctr"/>
+            <a:lstStyle/>
+            <a:p>
+              <a:pPr algn="ctr"/>
+              <a:endParaRPr lang="en-US"/>
+            </a:p>
+          </p:txBody>
+        </p:sp>
+        <p:sp>
+          <p:nvSpPr>
+            <p:cNvPr id="32" name="Oval 31">
+              <a:extLst>
+                <a:ext uri="{FF2B5EF4-FFF2-40B4-BE49-F238E27FC236}">
+                  <a16:creationId xmlns:a16="http://schemas.microsoft.com/office/drawing/2014/main" id="{94826A18-B80D-4B39-B6FE-A11FE3481651}"/>
+                </a:ext>
+              </a:extLst>
+            </p:cNvPr>
+            <p:cNvSpPr/>
+            <p:nvPr/>
+          </p:nvSpPr>
+          <p:spPr>
+            <a:xfrm>
+              <a:off x="2112852" y="1140821"/>
+              <a:ext cx="619346" cy="619346"/>
+            </a:xfrm>
+            <a:prstGeom prst="ellipse">
+              <a:avLst/>
+            </a:prstGeom>
+            <a:solidFill>
+              <a:schemeClr val="bg1"/>
+            </a:solidFill>
+            <a:ln>
+              <a:noFill/>
+            </a:ln>
+          </p:spPr>
+          <p:style>
+            <a:lnRef idx="2">
+              <a:schemeClr val="accent1">
+                <a:shade val="50000"/>
+              </a:schemeClr>
+            </a:lnRef>
+            <a:fillRef idx="1">
+              <a:schemeClr val="accent1"/>
+            </a:fillRef>
+            <a:effectRef idx="0">
+              <a:schemeClr val="accent1"/>
+            </a:effectRef>
+            <a:fontRef idx="minor">
+              <a:schemeClr val="lt1"/>
+            </a:fontRef>
+          </p:style>
+          <p:txBody>
+            <a:bodyPr rtlCol="0" anchor="ctr"/>
+            <a:lstStyle/>
+            <a:p>
+              <a:pPr algn="ctr"/>
+              <a:endParaRPr lang="en-US"/>
+            </a:p>
+          </p:txBody>
+        </p:sp>
+        <p:sp>
+          <p:nvSpPr>
+            <p:cNvPr id="36" name="Oval 35">
+              <a:extLst>
+                <a:ext uri="{FF2B5EF4-FFF2-40B4-BE49-F238E27FC236}">
+                  <a16:creationId xmlns:a16="http://schemas.microsoft.com/office/drawing/2014/main" id="{0D9F6BB4-8267-4A79-B0E7-51AE98C8717C}"/>
+                </a:ext>
+              </a:extLst>
+            </p:cNvPr>
+            <p:cNvSpPr/>
+            <p:nvPr/>
+          </p:nvSpPr>
+          <p:spPr>
+            <a:xfrm>
+              <a:off x="146198" y="2143226"/>
+              <a:ext cx="619346" cy="619346"/>
+            </a:xfrm>
+            <a:prstGeom prst="ellipse">
+              <a:avLst/>
+            </a:prstGeom>
+            <a:solidFill>
+              <a:schemeClr val="bg1"/>
+            </a:solidFill>
+            <a:ln>
+              <a:noFill/>
+            </a:ln>
+          </p:spPr>
+          <p:style>
+            <a:lnRef idx="2">
+              <a:schemeClr val="accent1">
+                <a:shade val="50000"/>
+              </a:schemeClr>
+            </a:lnRef>
+            <a:fillRef idx="1">
+              <a:schemeClr val="accent1"/>
+            </a:fillRef>
+            <a:effectRef idx="0">
+              <a:schemeClr val="accent1"/>
+            </a:effectRef>
+            <a:fontRef idx="minor">
+              <a:schemeClr val="lt1"/>
+            </a:fontRef>
+          </p:style>
+          <p:txBody>
+            <a:bodyPr rtlCol="0" anchor="ctr"/>
+            <a:lstStyle/>
+            <a:p>
+              <a:pPr algn="ctr"/>
+              <a:endParaRPr lang="en-US"/>
+            </a:p>
+          </p:txBody>
+        </p:sp>
+        <p:sp>
+          <p:nvSpPr>
+            <p:cNvPr id="37" name="Oval 36">
+              <a:extLst>
+                <a:ext uri="{FF2B5EF4-FFF2-40B4-BE49-F238E27FC236}">
+                  <a16:creationId xmlns:a16="http://schemas.microsoft.com/office/drawing/2014/main" id="{39784890-44C4-4A9C-8DF7-7C969EE555FD}"/>
+                </a:ext>
+              </a:extLst>
+            </p:cNvPr>
+            <p:cNvSpPr/>
+            <p:nvPr/>
+          </p:nvSpPr>
+          <p:spPr>
+            <a:xfrm>
+              <a:off x="1130190" y="2143226"/>
+              <a:ext cx="619346" cy="619346"/>
+            </a:xfrm>
+            <a:prstGeom prst="ellipse">
+              <a:avLst/>
+            </a:prstGeom>
+            <a:solidFill>
+              <a:schemeClr val="bg1"/>
+            </a:solidFill>
+            <a:ln>
+              <a:noFill/>
+            </a:ln>
+          </p:spPr>
+          <p:style>
+            <a:lnRef idx="2">
+              <a:schemeClr val="accent1">
+                <a:shade val="50000"/>
+              </a:schemeClr>
+            </a:lnRef>
+            <a:fillRef idx="1">
+              <a:schemeClr val="accent1"/>
+            </a:fillRef>
+            <a:effectRef idx="0">
+              <a:schemeClr val="accent1"/>
+            </a:effectRef>
+            <a:fontRef idx="minor">
+              <a:schemeClr val="lt1"/>
+            </a:fontRef>
+          </p:style>
+          <p:txBody>
+            <a:bodyPr rtlCol="0" anchor="ctr"/>
+            <a:lstStyle/>
+            <a:p>
+              <a:pPr algn="ctr"/>
+              <a:endParaRPr lang="en-US"/>
+            </a:p>
+          </p:txBody>
+        </p:sp>
+        <p:sp>
+          <p:nvSpPr>
+            <p:cNvPr id="38" name="Oval 37">
+              <a:extLst>
+                <a:ext uri="{FF2B5EF4-FFF2-40B4-BE49-F238E27FC236}">
+                  <a16:creationId xmlns:a16="http://schemas.microsoft.com/office/drawing/2014/main" id="{084C407C-FF4A-4963-86CA-5CE574A3D8E3}"/>
+                </a:ext>
+              </a:extLst>
+            </p:cNvPr>
+            <p:cNvSpPr/>
+            <p:nvPr/>
+          </p:nvSpPr>
+          <p:spPr>
+            <a:xfrm>
+              <a:off x="2112852" y="2143226"/>
+              <a:ext cx="619346" cy="619346"/>
+            </a:xfrm>
+            <a:prstGeom prst="ellipse">
+              <a:avLst/>
+            </a:prstGeom>
+            <a:solidFill>
+              <a:schemeClr val="bg1"/>
+            </a:solidFill>
+            <a:ln>
+              <a:noFill/>
+            </a:ln>
+          </p:spPr>
+          <p:style>
+            <a:lnRef idx="2">
+              <a:schemeClr val="accent1">
+                <a:shade val="50000"/>
+              </a:schemeClr>
+            </a:lnRef>
+            <a:fillRef idx="1">
+              <a:schemeClr val="accent1"/>
+            </a:fillRef>
+            <a:effectRef idx="0">
+              <a:schemeClr val="accent1"/>
+            </a:effectRef>
+            <a:fontRef idx="minor">
+              <a:schemeClr val="lt1"/>
+            </a:fontRef>
+          </p:style>
+          <p:txBody>
+            <a:bodyPr rtlCol="0" anchor="ctr"/>
+            <a:lstStyle/>
+            <a:p>
+              <a:pPr algn="ctr"/>
+              <a:endParaRPr lang="en-US"/>
+            </a:p>
+          </p:txBody>
+        </p:sp>
+        <p:pic>
+          <p:nvPicPr>
+            <p:cNvPr id="11" name="Graphic 10" descr="Stopwatch outline">
+              <a:extLst>
+                <a:ext uri="{FF2B5EF4-FFF2-40B4-BE49-F238E27FC236}">
+                  <a16:creationId xmlns:a16="http://schemas.microsoft.com/office/drawing/2014/main" id="{870BA9CF-28B6-4715-AEBE-845CF7D7A902}"/>
+                </a:ext>
+              </a:extLst>
+            </p:cNvPr>
+            <p:cNvPicPr>
+              <a:picLocks noChangeAspect="1"/>
+            </p:cNvPicPr>
+            <p:nvPr/>
+          </p:nvPicPr>
+          <p:blipFill>
+            <a:blip r:embed="rId2">
+              <a:extLst>
+                <a:ext uri="{28A0092B-C50C-407E-A947-70E740481C1C}">
+                  <a14:useLocalDpi xmlns:a14="http://schemas.microsoft.com/office/drawing/2010/main" val="0"/>
+                </a:ext>
+                <a:ext uri="{96DAC541-7B7A-43D3-8B79-37D633B846F1}">
+                  <asvg:svgBlip xmlns:asvg="http://schemas.microsoft.com/office/drawing/2016/SVG/main" r:embed="rId3"/>
+                </a:ext>
+              </a:extLst>
+            </a:blip>
+            <a:stretch>
+              <a:fillRect/>
+            </a:stretch>
+          </p:blipFill>
+          <p:spPr>
+            <a:xfrm>
+              <a:off x="0" y="0"/>
+              <a:ext cx="914400" cy="914400"/>
+            </a:xfrm>
+            <a:prstGeom prst="rect">
+              <a:avLst/>
+            </a:prstGeom>
+          </p:spPr>
+        </p:pic>
+        <p:pic>
+          <p:nvPicPr>
+            <p:cNvPr id="13" name="Graphic 12" descr="Stopwatch 75% outline">
+              <a:extLst>
+                <a:ext uri="{FF2B5EF4-FFF2-40B4-BE49-F238E27FC236}">
+                  <a16:creationId xmlns:a16="http://schemas.microsoft.com/office/drawing/2014/main" id="{904A1944-0FE8-41F9-8E76-77EBA79F621F}"/>
+                </a:ext>
+              </a:extLst>
+            </p:cNvPr>
+            <p:cNvPicPr>
+              <a:picLocks noChangeAspect="1"/>
+            </p:cNvPicPr>
+            <p:nvPr/>
+          </p:nvPicPr>
+          <p:blipFill>
+            <a:blip r:embed="rId4">
+              <a:extLst>
+                <a:ext uri="{28A0092B-C50C-407E-A947-70E740481C1C}">
+                  <a14:useLocalDpi xmlns:a14="http://schemas.microsoft.com/office/drawing/2010/main" val="0"/>
+                </a:ext>
+                <a:ext uri="{96DAC541-7B7A-43D3-8B79-37D633B846F1}">
+                  <asvg:svgBlip xmlns:asvg="http://schemas.microsoft.com/office/drawing/2016/SVG/main" r:embed="rId5"/>
+                </a:ext>
+              </a:extLst>
+            </a:blip>
+            <a:stretch>
+              <a:fillRect/>
+            </a:stretch>
+          </p:blipFill>
+          <p:spPr>
+            <a:xfrm>
+              <a:off x="0" y="1945900"/>
+              <a:ext cx="914400" cy="914400"/>
+            </a:xfrm>
+            <a:prstGeom prst="rect">
+              <a:avLst/>
+            </a:prstGeom>
+          </p:spPr>
+        </p:pic>
+        <p:pic>
+          <p:nvPicPr>
+            <p:cNvPr id="15" name="Graphic 14" descr="Stopwatch 33% outline">
+              <a:extLst>
+                <a:ext uri="{FF2B5EF4-FFF2-40B4-BE49-F238E27FC236}">
+                  <a16:creationId xmlns:a16="http://schemas.microsoft.com/office/drawing/2014/main" id="{E2474B18-BDEF-4D85-970C-2BA5D0C57559}"/>
+                </a:ext>
+              </a:extLst>
+            </p:cNvPr>
+            <p:cNvPicPr>
+              <a:picLocks noChangeAspect="1"/>
+            </p:cNvPicPr>
+            <p:nvPr/>
+          </p:nvPicPr>
+          <p:blipFill>
+            <a:blip r:embed="rId6">
+              <a:extLst>
+                <a:ext uri="{28A0092B-C50C-407E-A947-70E740481C1C}">
+                  <a14:useLocalDpi xmlns:a14="http://schemas.microsoft.com/office/drawing/2010/main" val="0"/>
+                </a:ext>
+                <a:ext uri="{96DAC541-7B7A-43D3-8B79-37D633B846F1}">
+                  <asvg:svgBlip xmlns:asvg="http://schemas.microsoft.com/office/drawing/2016/SVG/main" r:embed="rId7"/>
+                </a:ext>
+              </a:extLst>
+            </a:blip>
+            <a:stretch>
+              <a:fillRect/>
+            </a:stretch>
+          </p:blipFill>
+          <p:spPr>
+            <a:xfrm>
+              <a:off x="0" y="943781"/>
+              <a:ext cx="914400" cy="914400"/>
+            </a:xfrm>
+            <a:prstGeom prst="rect">
+              <a:avLst/>
+            </a:prstGeom>
+          </p:spPr>
+        </p:pic>
+        <p:pic>
+          <p:nvPicPr>
+            <p:cNvPr id="17" name="Graphic 16" descr="Stopwatch 66% outline">
+              <a:extLst>
+                <a:ext uri="{FF2B5EF4-FFF2-40B4-BE49-F238E27FC236}">
+                  <a16:creationId xmlns:a16="http://schemas.microsoft.com/office/drawing/2014/main" id="{DD57374E-F546-4121-BD76-AFE80DD71CC9}"/>
+                </a:ext>
+              </a:extLst>
+            </p:cNvPr>
+            <p:cNvPicPr>
+              <a:picLocks noChangeAspect="1"/>
+            </p:cNvPicPr>
+            <p:nvPr/>
+          </p:nvPicPr>
+          <p:blipFill>
+            <a:blip r:embed="rId8">
+              <a:extLst>
+                <a:ext uri="{28A0092B-C50C-407E-A947-70E740481C1C}">
+                  <a14:useLocalDpi xmlns:a14="http://schemas.microsoft.com/office/drawing/2010/main" val="0"/>
+                </a:ext>
+                <a:ext uri="{96DAC541-7B7A-43D3-8B79-37D633B846F1}">
+                  <asvg:svgBlip xmlns:asvg="http://schemas.microsoft.com/office/drawing/2016/SVG/main" r:embed="rId9"/>
+                </a:ext>
+              </a:extLst>
+            </a:blip>
+            <a:stretch>
+              <a:fillRect/>
+            </a:stretch>
+          </p:blipFill>
+          <p:spPr>
+            <a:xfrm>
+              <a:off x="1965325" y="943781"/>
+              <a:ext cx="914400" cy="914400"/>
+            </a:xfrm>
+            <a:prstGeom prst="rect">
+              <a:avLst/>
+            </a:prstGeom>
+          </p:spPr>
+        </p:pic>
+        <p:pic>
+          <p:nvPicPr>
+            <p:cNvPr id="19" name="Graphic 18" descr="Stopwatch 25% outline">
+              <a:extLst>
+                <a:ext uri="{FF2B5EF4-FFF2-40B4-BE49-F238E27FC236}">
+                  <a16:creationId xmlns:a16="http://schemas.microsoft.com/office/drawing/2014/main" id="{ADB0B622-FBF6-473A-862A-4387C8AA66F2}"/>
+                </a:ext>
+              </a:extLst>
+            </p:cNvPr>
+            <p:cNvPicPr>
+              <a:picLocks noChangeAspect="1"/>
+            </p:cNvPicPr>
+            <p:nvPr/>
+          </p:nvPicPr>
+          <p:blipFill>
+            <a:blip r:embed="rId10">
+              <a:extLst>
+                <a:ext uri="{28A0092B-C50C-407E-A947-70E740481C1C}">
+                  <a14:useLocalDpi xmlns:a14="http://schemas.microsoft.com/office/drawing/2010/main" val="0"/>
+                </a:ext>
+                <a:ext uri="{96DAC541-7B7A-43D3-8B79-37D633B846F1}">
+                  <asvg:svgBlip xmlns:asvg="http://schemas.microsoft.com/office/drawing/2016/SVG/main" r:embed="rId11"/>
+                </a:ext>
+              </a:extLst>
+            </a:blip>
+            <a:stretch>
+              <a:fillRect/>
+            </a:stretch>
+          </p:blipFill>
+          <p:spPr>
+            <a:xfrm>
+              <a:off x="1965325" y="0"/>
+              <a:ext cx="914400" cy="914400"/>
+            </a:xfrm>
+            <a:prstGeom prst="rect">
+              <a:avLst/>
+            </a:prstGeom>
+          </p:spPr>
+        </p:pic>
+        <p:pic>
+          <p:nvPicPr>
+            <p:cNvPr id="21" name="Graphic 20" descr="Stopwatch 75% outline">
+              <a:extLst>
+                <a:ext uri="{FF2B5EF4-FFF2-40B4-BE49-F238E27FC236}">
+                  <a16:creationId xmlns:a16="http://schemas.microsoft.com/office/drawing/2014/main" id="{6CAA1106-51A5-4CAC-9C13-37D49828B150}"/>
+                </a:ext>
+              </a:extLst>
+            </p:cNvPr>
+            <p:cNvPicPr>
+              <a:picLocks noChangeAspect="1"/>
+            </p:cNvPicPr>
+            <p:nvPr/>
+          </p:nvPicPr>
+          <p:blipFill>
+            <a:blip r:embed="rId12">
+              <a:extLst>
+                <a:ext uri="{28A0092B-C50C-407E-A947-70E740481C1C}">
+                  <a14:useLocalDpi xmlns:a14="http://schemas.microsoft.com/office/drawing/2010/main" val="0"/>
+                </a:ext>
+                <a:ext uri="{96DAC541-7B7A-43D3-8B79-37D633B846F1}">
+                  <asvg:svgBlip xmlns:asvg="http://schemas.microsoft.com/office/drawing/2016/SVG/main" r:embed="rId13"/>
+                </a:ext>
+              </a:extLst>
+            </a:blip>
+            <a:stretch>
+              <a:fillRect/>
+            </a:stretch>
+          </p:blipFill>
+          <p:spPr>
+            <a:xfrm>
+              <a:off x="1965325" y="1945900"/>
+              <a:ext cx="914400" cy="914400"/>
+            </a:xfrm>
+            <a:prstGeom prst="rect">
+              <a:avLst/>
+            </a:prstGeom>
+          </p:spPr>
+        </p:pic>
+        <p:pic>
+          <p:nvPicPr>
+            <p:cNvPr id="23" name="Graphic 22" descr="Stopwatch 50% outline">
+              <a:extLst>
+                <a:ext uri="{FF2B5EF4-FFF2-40B4-BE49-F238E27FC236}">
+                  <a16:creationId xmlns:a16="http://schemas.microsoft.com/office/drawing/2014/main" id="{371CB739-B48C-42FA-8ADF-D7BBB906F45A}"/>
+                </a:ext>
+              </a:extLst>
+            </p:cNvPr>
+            <p:cNvPicPr>
+              <a:picLocks noChangeAspect="1"/>
+            </p:cNvPicPr>
+            <p:nvPr/>
+          </p:nvPicPr>
+          <p:blipFill>
+            <a:blip r:embed="rId14">
+              <a:extLst>
+                <a:ext uri="{28A0092B-C50C-407E-A947-70E740481C1C}">
+                  <a14:useLocalDpi xmlns:a14="http://schemas.microsoft.com/office/drawing/2010/main" val="0"/>
+                </a:ext>
+                <a:ext uri="{96DAC541-7B7A-43D3-8B79-37D633B846F1}">
+                  <asvg:svgBlip xmlns:asvg="http://schemas.microsoft.com/office/drawing/2016/SVG/main" r:embed="rId15"/>
+                </a:ext>
+              </a:extLst>
+            </a:blip>
+            <a:stretch>
+              <a:fillRect/>
+            </a:stretch>
+          </p:blipFill>
+          <p:spPr>
+            <a:xfrm>
+              <a:off x="982662" y="943781"/>
+              <a:ext cx="914400" cy="914400"/>
+            </a:xfrm>
+            <a:prstGeom prst="rect">
+              <a:avLst/>
+            </a:prstGeom>
+          </p:spPr>
+        </p:pic>
+        <p:sp>
+          <p:nvSpPr>
+            <p:cNvPr id="3" name="Freeform: Shape 2">
+              <a:extLst>
+                <a:ext uri="{FF2B5EF4-FFF2-40B4-BE49-F238E27FC236}">
+                  <a16:creationId xmlns:a16="http://schemas.microsoft.com/office/drawing/2014/main" id="{6E47B02F-A47A-4EDD-BDCA-E18EB6530778}"/>
+                </a:ext>
+              </a:extLst>
+            </p:cNvPr>
+            <p:cNvSpPr/>
+            <p:nvPr/>
+          </p:nvSpPr>
+          <p:spPr>
+            <a:xfrm>
+              <a:off x="1124832" y="114300"/>
+              <a:ext cx="629360" cy="705661"/>
+            </a:xfrm>
+            <a:custGeom>
+              <a:avLst/>
+              <a:gdLst>
+                <a:gd name="connsiteX0" fmla="*/ 519399 w 629360"/>
+                <a:gd name="connsiteY0" fmla="*/ 152000 h 705661"/>
+                <a:gd name="connsiteX1" fmla="*/ 559889 w 629360"/>
+                <a:gd name="connsiteY1" fmla="*/ 111509 h 705661"/>
+                <a:gd name="connsiteX2" fmla="*/ 559655 w 629360"/>
+                <a:gd name="connsiteY2" fmla="*/ 98041 h 705661"/>
+                <a:gd name="connsiteX3" fmla="*/ 546421 w 629360"/>
+                <a:gd name="connsiteY3" fmla="*/ 98041 h 705661"/>
+                <a:gd name="connsiteX4" fmla="*/ 504511 w 629360"/>
+                <a:gd name="connsiteY4" fmla="*/ 139951 h 705661"/>
+                <a:gd name="connsiteX5" fmla="*/ 324555 w 629360"/>
+                <a:gd name="connsiteY5" fmla="*/ 76438 h 705661"/>
+                <a:gd name="connsiteX6" fmla="*/ 324555 w 629360"/>
+                <a:gd name="connsiteY6" fmla="*/ 19050 h 705661"/>
+                <a:gd name="connsiteX7" fmla="*/ 419805 w 629360"/>
+                <a:gd name="connsiteY7" fmla="*/ 19050 h 705661"/>
+                <a:gd name="connsiteX8" fmla="*/ 419805 w 629360"/>
+                <a:gd name="connsiteY8" fmla="*/ 0 h 705661"/>
+                <a:gd name="connsiteX9" fmla="*/ 210255 w 629360"/>
+                <a:gd name="connsiteY9" fmla="*/ 0 h 705661"/>
+                <a:gd name="connsiteX10" fmla="*/ 210255 w 629360"/>
+                <a:gd name="connsiteY10" fmla="*/ 19050 h 705661"/>
+                <a:gd name="connsiteX11" fmla="*/ 305505 w 629360"/>
+                <a:gd name="connsiteY11" fmla="*/ 19050 h 705661"/>
+                <a:gd name="connsiteX12" fmla="*/ 305505 w 629360"/>
+                <a:gd name="connsiteY12" fmla="*/ 76438 h 705661"/>
+                <a:gd name="connsiteX13" fmla="*/ 136 w 629360"/>
+                <a:gd name="connsiteY13" fmla="*/ 400157 h 705661"/>
+                <a:gd name="connsiteX14" fmla="*/ 323855 w 629360"/>
+                <a:gd name="connsiteY14" fmla="*/ 705525 h 705661"/>
+                <a:gd name="connsiteX15" fmla="*/ 629224 w 629360"/>
+                <a:gd name="connsiteY15" fmla="*/ 381807 h 705661"/>
+                <a:gd name="connsiteX16" fmla="*/ 519399 w 629360"/>
+                <a:gd name="connsiteY16" fmla="*/ 152000 h 705661"/>
+                <a:gd name="connsiteX17" fmla="*/ 347091 w 629360"/>
+                <a:gd name="connsiteY17" fmla="*/ 684095 h 705661"/>
+                <a:gd name="connsiteX18" fmla="*/ 21533 w 629360"/>
+                <a:gd name="connsiteY18" fmla="*/ 422586 h 705661"/>
+                <a:gd name="connsiteX19" fmla="*/ 283042 w 629360"/>
+                <a:gd name="connsiteY19" fmla="*/ 97028 h 705661"/>
+                <a:gd name="connsiteX20" fmla="*/ 608600 w 629360"/>
+                <a:gd name="connsiteY20" fmla="*/ 358537 h 705661"/>
+                <a:gd name="connsiteX21" fmla="*/ 608600 w 629360"/>
+                <a:gd name="connsiteY21" fmla="*/ 422586 h 705661"/>
+                <a:gd name="connsiteX22" fmla="*/ 347091 w 629360"/>
+                <a:gd name="connsiteY22" fmla="*/ 684095 h 705661"/>
+              </a:gdLst>
+              <a:ahLst/>
+              <a:cxnLst>
+                <a:cxn ang="0">
+                  <a:pos x="connsiteX0" y="connsiteY0"/>
+                </a:cxn>
+                <a:cxn ang="0">
+                  <a:pos x="connsiteX1" y="connsiteY1"/>
+                </a:cxn>
+                <a:cxn ang="0">
+                  <a:pos x="connsiteX2" y="connsiteY2"/>
+                </a:cxn>
+                <a:cxn ang="0">
+                  <a:pos x="connsiteX3" y="connsiteY3"/>
+                </a:cxn>
+                <a:cxn ang="0">
+                  <a:pos x="connsiteX4" y="connsiteY4"/>
+                </a:cxn>
+                <a:cxn ang="0">
+                  <a:pos x="connsiteX5" y="connsiteY5"/>
+                </a:cxn>
+                <a:cxn ang="0">
+                  <a:pos x="connsiteX6" y="connsiteY6"/>
+                </a:cxn>
+                <a:cxn ang="0">
+                  <a:pos x="connsiteX7" y="connsiteY7"/>
+                </a:cxn>
+                <a:cxn ang="0">
+                  <a:pos x="connsiteX8" y="connsiteY8"/>
+                </a:cxn>
+                <a:cxn ang="0">
+                  <a:pos x="connsiteX9" y="connsiteY9"/>
+                </a:cxn>
+                <a:cxn ang="0">
+                  <a:pos x="connsiteX10" y="connsiteY10"/>
+                </a:cxn>
+                <a:cxn ang="0">
+                  <a:pos x="connsiteX11" y="connsiteY11"/>
+                </a:cxn>
+                <a:cxn ang="0">
+                  <a:pos x="connsiteX12" y="connsiteY12"/>
+                </a:cxn>
+                <a:cxn ang="0">
+                  <a:pos x="connsiteX13" y="connsiteY13"/>
+                </a:cxn>
+                <a:cxn ang="0">
+                  <a:pos x="connsiteX14" y="connsiteY14"/>
+                </a:cxn>
+                <a:cxn ang="0">
+                  <a:pos x="connsiteX15" y="connsiteY15"/>
+                </a:cxn>
+                <a:cxn ang="0">
+                  <a:pos x="connsiteX16" y="connsiteY16"/>
+                </a:cxn>
+                <a:cxn ang="0">
+                  <a:pos x="connsiteX17" y="connsiteY17"/>
+                </a:cxn>
+                <a:cxn ang="0">
+                  <a:pos x="connsiteX18" y="connsiteY18"/>
+                </a:cxn>
+                <a:cxn ang="0">
+                  <a:pos x="connsiteX19" y="connsiteY19"/>
+                </a:cxn>
+                <a:cxn ang="0">
+                  <a:pos x="connsiteX20" y="connsiteY20"/>
+                </a:cxn>
+                <a:cxn ang="0">
+                  <a:pos x="connsiteX21" y="connsiteY21"/>
+                </a:cxn>
+                <a:cxn ang="0">
+                  <a:pos x="connsiteX22" y="connsiteY22"/>
+                </a:cxn>
+              </a:cxnLst>
+              <a:rect l="l" t="t" r="r" b="b"/>
+              <a:pathLst>
+                <a:path w="629360" h="705661">
+                  <a:moveTo>
+                    <a:pt x="519399" y="152000"/>
+                  </a:moveTo>
+                  <a:lnTo>
+                    <a:pt x="559889" y="111509"/>
+                  </a:lnTo>
+                  <a:cubicBezTo>
+                    <a:pt x="563544" y="107725"/>
+                    <a:pt x="563439" y="101696"/>
+                    <a:pt x="559655" y="98041"/>
+                  </a:cubicBezTo>
+                  <a:cubicBezTo>
+                    <a:pt x="555964" y="94476"/>
+                    <a:pt x="550112" y="94476"/>
+                    <a:pt x="546421" y="98041"/>
+                  </a:cubicBezTo>
+                  <a:lnTo>
+                    <a:pt x="504511" y="139951"/>
+                  </a:lnTo>
+                  <a:cubicBezTo>
+                    <a:pt x="452611" y="100542"/>
+                    <a:pt x="389694" y="78336"/>
+                    <a:pt x="324555" y="76438"/>
+                  </a:cubicBezTo>
+                  <a:lnTo>
+                    <a:pt x="324555" y="19050"/>
+                  </a:lnTo>
+                  <a:lnTo>
+                    <a:pt x="419805" y="19050"/>
+                  </a:lnTo>
+                  <a:lnTo>
+                    <a:pt x="419805" y="0"/>
+                  </a:lnTo>
+                  <a:lnTo>
+                    <a:pt x="210255" y="0"/>
+                  </a:lnTo>
+                  <a:lnTo>
+                    <a:pt x="210255" y="19050"/>
+                  </a:lnTo>
+                  <a:lnTo>
+                    <a:pt x="305505" y="19050"/>
+                  </a:lnTo>
+                  <a:lnTo>
+                    <a:pt x="305505" y="76438"/>
+                  </a:lnTo>
+                  <a:cubicBezTo>
+                    <a:pt x="131787" y="81505"/>
+                    <a:pt x="-4931" y="226439"/>
+                    <a:pt x="136" y="400157"/>
+                  </a:cubicBezTo>
+                  <a:cubicBezTo>
+                    <a:pt x="5204" y="573875"/>
+                    <a:pt x="150138" y="710593"/>
+                    <a:pt x="323855" y="705525"/>
+                  </a:cubicBezTo>
+                  <a:cubicBezTo>
+                    <a:pt x="497573" y="700458"/>
+                    <a:pt x="634291" y="555525"/>
+                    <a:pt x="629224" y="381807"/>
+                  </a:cubicBezTo>
+                  <a:cubicBezTo>
+                    <a:pt x="626638" y="293150"/>
+                    <a:pt x="586757" y="209701"/>
+                    <a:pt x="519399" y="152000"/>
+                  </a:cubicBezTo>
+                  <a:close/>
+                  <a:moveTo>
+                    <a:pt x="347091" y="684095"/>
+                  </a:moveTo>
+                  <a:cubicBezTo>
+                    <a:pt x="184978" y="701782"/>
+                    <a:pt x="39220" y="584700"/>
+                    <a:pt x="21533" y="422586"/>
+                  </a:cubicBezTo>
+                  <a:cubicBezTo>
+                    <a:pt x="3847" y="260473"/>
+                    <a:pt x="120929" y="114715"/>
+                    <a:pt x="283042" y="97028"/>
+                  </a:cubicBezTo>
+                  <a:cubicBezTo>
+                    <a:pt x="445157" y="79342"/>
+                    <a:pt x="590913" y="196424"/>
+                    <a:pt x="608600" y="358537"/>
+                  </a:cubicBezTo>
+                  <a:cubicBezTo>
+                    <a:pt x="610922" y="379824"/>
+                    <a:pt x="610922" y="401300"/>
+                    <a:pt x="608600" y="422586"/>
+                  </a:cubicBezTo>
+                  <a:cubicBezTo>
+                    <a:pt x="593452" y="560252"/>
+                    <a:pt x="484757" y="668946"/>
+                    <a:pt x="347091" y="684095"/>
+                  </a:cubicBezTo>
+                  <a:close/>
+                </a:path>
+              </a:pathLst>
+            </a:custGeom>
+            <a:solidFill>
+              <a:srgbClr val="000000"/>
+            </a:solidFill>
+            <a:ln w="9525" cap="flat">
+              <a:noFill/>
+              <a:prstDash val="solid"/>
+              <a:miter/>
+            </a:ln>
+          </p:spPr>
+          <p:txBody>
+            <a:bodyPr rtlCol="0" anchor="ctr"/>
+            <a:lstStyle/>
+            <a:p>
+              <a:endParaRPr lang="en-US"/>
+            </a:p>
+          </p:txBody>
+        </p:sp>
+        <p:sp>
+          <p:nvSpPr>
+            <p:cNvPr id="4" name="Freeform: Shape 3">
+              <a:extLst>
+                <a:ext uri="{FF2B5EF4-FFF2-40B4-BE49-F238E27FC236}">
+                  <a16:creationId xmlns:a16="http://schemas.microsoft.com/office/drawing/2014/main" id="{8F66B1B9-63E0-4E79-A56A-CA2183F63D2F}"/>
+                </a:ext>
+              </a:extLst>
+            </p:cNvPr>
+            <p:cNvSpPr/>
+            <p:nvPr/>
+          </p:nvSpPr>
+          <p:spPr>
+            <a:xfrm rot="19800000">
+              <a:off x="1338898" y="243841"/>
+              <a:ext cx="304799" cy="257184"/>
+            </a:xfrm>
+            <a:custGeom>
+              <a:avLst/>
+              <a:gdLst>
+                <a:gd name="connsiteX0" fmla="*/ 47625 w 304799"/>
+                <a:gd name="connsiteY0" fmla="*/ 0 h 257184"/>
+                <a:gd name="connsiteX1" fmla="*/ 47625 w 304799"/>
+                <a:gd name="connsiteY1" fmla="*/ 19050 h 257184"/>
+                <a:gd name="connsiteX2" fmla="*/ 246697 w 304799"/>
+                <a:gd name="connsiteY2" fmla="*/ 199920 h 257184"/>
+                <a:gd name="connsiteX3" fmla="*/ 246593 w 304799"/>
+                <a:gd name="connsiteY3" fmla="*/ 200025 h 257184"/>
+                <a:gd name="connsiteX4" fmla="*/ 94297 w 304799"/>
+                <a:gd name="connsiteY4" fmla="*/ 200025 h 257184"/>
+                <a:gd name="connsiteX5" fmla="*/ 38109 w 304799"/>
+                <a:gd name="connsiteY5" fmla="*/ 162887 h 257184"/>
+                <a:gd name="connsiteX6" fmla="*/ 971 w 304799"/>
+                <a:gd name="connsiteY6" fmla="*/ 219075 h 257184"/>
+                <a:gd name="connsiteX7" fmla="*/ 57159 w 304799"/>
+                <a:gd name="connsiteY7" fmla="*/ 256213 h 257184"/>
+                <a:gd name="connsiteX8" fmla="*/ 94297 w 304799"/>
+                <a:gd name="connsiteY8" fmla="*/ 219075 h 257184"/>
+                <a:gd name="connsiteX9" fmla="*/ 304800 w 304799"/>
+                <a:gd name="connsiteY9" fmla="*/ 219075 h 257184"/>
+                <a:gd name="connsiteX10" fmla="*/ 304800 w 304799"/>
+                <a:gd name="connsiteY10" fmla="*/ 200025 h 257184"/>
+                <a:gd name="connsiteX11" fmla="*/ 265823 w 304799"/>
+                <a:gd name="connsiteY11" fmla="*/ 200025 h 257184"/>
+                <a:gd name="connsiteX12" fmla="*/ 47625 w 304799"/>
+                <a:gd name="connsiteY12" fmla="*/ 0 h 257184"/>
+                <a:gd name="connsiteX13" fmla="*/ 47625 w 304799"/>
+                <a:gd name="connsiteY13" fmla="*/ 238125 h 257184"/>
+                <a:gd name="connsiteX14" fmla="*/ 19050 w 304799"/>
+                <a:gd name="connsiteY14" fmla="*/ 209550 h 257184"/>
+                <a:gd name="connsiteX15" fmla="*/ 47625 w 304799"/>
+                <a:gd name="connsiteY15" fmla="*/ 180975 h 257184"/>
+                <a:gd name="connsiteX16" fmla="*/ 76200 w 304799"/>
+                <a:gd name="connsiteY16" fmla="*/ 209550 h 257184"/>
+                <a:gd name="connsiteX17" fmla="*/ 47625 w 304799"/>
+                <a:gd name="connsiteY17" fmla="*/ 238125 h 257184"/>
+              </a:gdLst>
+              <a:ahLst/>
+              <a:cxnLst>
+                <a:cxn ang="0">
+                  <a:pos x="connsiteX0" y="connsiteY0"/>
+                </a:cxn>
+                <a:cxn ang="0">
+                  <a:pos x="connsiteX1" y="connsiteY1"/>
+                </a:cxn>
+                <a:cxn ang="0">
+                  <a:pos x="connsiteX2" y="connsiteY2"/>
+                </a:cxn>
+                <a:cxn ang="0">
+                  <a:pos x="connsiteX3" y="connsiteY3"/>
+                </a:cxn>
+                <a:cxn ang="0">
+                  <a:pos x="connsiteX4" y="connsiteY4"/>
+                </a:cxn>
+                <a:cxn ang="0">
+                  <a:pos x="connsiteX5" y="connsiteY5"/>
+                </a:cxn>
+                <a:cxn ang="0">
+                  <a:pos x="connsiteX6" y="connsiteY6"/>
+                </a:cxn>
+                <a:cxn ang="0">
+                  <a:pos x="connsiteX7" y="connsiteY7"/>
+                </a:cxn>
+                <a:cxn ang="0">
+                  <a:pos x="connsiteX8" y="connsiteY8"/>
+                </a:cxn>
+                <a:cxn ang="0">
+                  <a:pos x="connsiteX9" y="connsiteY9"/>
+                </a:cxn>
+                <a:cxn ang="0">
+                  <a:pos x="connsiteX10" y="connsiteY10"/>
+                </a:cxn>
+                <a:cxn ang="0">
+                  <a:pos x="connsiteX11" y="connsiteY11"/>
+                </a:cxn>
+                <a:cxn ang="0">
+                  <a:pos x="connsiteX12" y="connsiteY12"/>
+                </a:cxn>
+                <a:cxn ang="0">
+                  <a:pos x="connsiteX13" y="connsiteY13"/>
+                </a:cxn>
+                <a:cxn ang="0">
+                  <a:pos x="connsiteX14" y="connsiteY14"/>
+                </a:cxn>
+                <a:cxn ang="0">
+                  <a:pos x="connsiteX15" y="connsiteY15"/>
+                </a:cxn>
+                <a:cxn ang="0">
+                  <a:pos x="connsiteX16" y="connsiteY16"/>
+                </a:cxn>
+                <a:cxn ang="0">
+                  <a:pos x="connsiteX17" y="connsiteY17"/>
+                </a:cxn>
+              </a:cxnLst>
+              <a:rect l="l" t="t" r="r" b="b"/>
+              <a:pathLst>
+                <a:path w="304799" h="257184">
+                  <a:moveTo>
+                    <a:pt x="47625" y="0"/>
+                  </a:moveTo>
+                  <a:lnTo>
+                    <a:pt x="47625" y="19050"/>
+                  </a:lnTo>
+                  <a:cubicBezTo>
+                    <a:pt x="150621" y="19179"/>
+                    <a:pt x="236724" y="97408"/>
+                    <a:pt x="246697" y="199920"/>
+                  </a:cubicBezTo>
+                  <a:cubicBezTo>
+                    <a:pt x="246697" y="199978"/>
+                    <a:pt x="246651" y="200025"/>
+                    <a:pt x="246593" y="200025"/>
+                  </a:cubicBezTo>
+                  <a:lnTo>
+                    <a:pt x="94297" y="200025"/>
+                  </a:lnTo>
+                  <a:cubicBezTo>
+                    <a:pt x="89037" y="174254"/>
+                    <a:pt x="63881" y="157626"/>
+                    <a:pt x="38109" y="162887"/>
+                  </a:cubicBezTo>
+                  <a:cubicBezTo>
+                    <a:pt x="12338" y="168148"/>
+                    <a:pt x="-4288" y="193304"/>
+                    <a:pt x="971" y="219075"/>
+                  </a:cubicBezTo>
+                  <a:cubicBezTo>
+                    <a:pt x="6232" y="244846"/>
+                    <a:pt x="31388" y="261474"/>
+                    <a:pt x="57159" y="256213"/>
+                  </a:cubicBezTo>
+                  <a:cubicBezTo>
+                    <a:pt x="75863" y="252395"/>
+                    <a:pt x="90480" y="237778"/>
+                    <a:pt x="94297" y="219075"/>
+                  </a:cubicBezTo>
+                  <a:lnTo>
+                    <a:pt x="304800" y="219075"/>
+                  </a:lnTo>
+                  <a:lnTo>
+                    <a:pt x="304800" y="200025"/>
+                  </a:lnTo>
+                  <a:lnTo>
+                    <a:pt x="265823" y="200025"/>
+                  </a:lnTo>
+                  <a:cubicBezTo>
+                    <a:pt x="255824" y="86925"/>
+                    <a:pt x="161166" y="150"/>
+                    <a:pt x="47625" y="0"/>
+                  </a:cubicBezTo>
+                  <a:close/>
+                  <a:moveTo>
+                    <a:pt x="47625" y="238125"/>
+                  </a:moveTo>
+                  <a:cubicBezTo>
+                    <a:pt x="31843" y="238125"/>
+                    <a:pt x="19050" y="225332"/>
+                    <a:pt x="19050" y="209550"/>
+                  </a:cubicBezTo>
+                  <a:cubicBezTo>
+                    <a:pt x="19050" y="193768"/>
+                    <a:pt x="31843" y="180975"/>
+                    <a:pt x="47625" y="180975"/>
+                  </a:cubicBezTo>
+                  <a:cubicBezTo>
+                    <a:pt x="63407" y="180975"/>
+                    <a:pt x="76200" y="193768"/>
+                    <a:pt x="76200" y="209550"/>
+                  </a:cubicBezTo>
+                  <a:cubicBezTo>
+                    <a:pt x="76200" y="225332"/>
+                    <a:pt x="63407" y="238125"/>
+                    <a:pt x="47625" y="238125"/>
+                  </a:cubicBezTo>
+                  <a:close/>
+                </a:path>
+              </a:pathLst>
+            </a:custGeom>
+            <a:solidFill>
+              <a:srgbClr val="000000"/>
+            </a:solidFill>
+            <a:ln w="9525" cap="flat">
+              <a:noFill/>
+              <a:prstDash val="solid"/>
+              <a:miter/>
+            </a:ln>
+          </p:spPr>
+          <p:txBody>
+            <a:bodyPr rtlCol="0" anchor="ctr"/>
+            <a:lstStyle/>
+            <a:p>
+              <a:endParaRPr lang="en-US"/>
+            </a:p>
+          </p:txBody>
+        </p:sp>
+        <p:sp>
+          <p:nvSpPr>
+            <p:cNvPr id="5" name="Rectangle 4">
+              <a:extLst>
+                <a:ext uri="{FF2B5EF4-FFF2-40B4-BE49-F238E27FC236}">
+                  <a16:creationId xmlns:a16="http://schemas.microsoft.com/office/drawing/2014/main" id="{7E799198-399B-49BE-8828-C827CB6CF35B}"/>
+                </a:ext>
+              </a:extLst>
+            </p:cNvPr>
+            <p:cNvSpPr/>
+            <p:nvPr/>
+          </p:nvSpPr>
+          <p:spPr>
+            <a:xfrm>
+              <a:off x="1312545" y="270510"/>
+              <a:ext cx="119697" cy="93345"/>
+            </a:xfrm>
+            <a:prstGeom prst="rect">
+              <a:avLst/>
+            </a:prstGeom>
+            <a:solidFill>
+              <a:schemeClr val="bg1"/>
+            </a:solidFill>
+            <a:ln>
+              <a:solidFill>
+                <a:schemeClr val="bg1"/>
+              </a:solidFill>
+            </a:ln>
+          </p:spPr>
+          <p:style>
+            <a:lnRef idx="2">
+              <a:schemeClr val="accent1">
+                <a:shade val="50000"/>
+              </a:schemeClr>
+            </a:lnRef>
+            <a:fillRef idx="1">
+              <a:schemeClr val="accent1"/>
+            </a:fillRef>
+            <a:effectRef idx="0">
+              <a:schemeClr val="accent1"/>
+            </a:effectRef>
+            <a:fontRef idx="minor">
+              <a:schemeClr val="lt1"/>
+            </a:fontRef>
+          </p:style>
+          <p:txBody>
+            <a:bodyPr rtlCol="0" anchor="ctr"/>
+            <a:lstStyle/>
+            <a:p>
+              <a:pPr algn="ctr"/>
+              <a:endParaRPr lang="en-US"/>
+            </a:p>
+          </p:txBody>
+        </p:sp>
+        <p:sp>
+          <p:nvSpPr>
+            <p:cNvPr id="24" name="Freeform: Shape 23">
+              <a:extLst>
+                <a:ext uri="{FF2B5EF4-FFF2-40B4-BE49-F238E27FC236}">
+                  <a16:creationId xmlns:a16="http://schemas.microsoft.com/office/drawing/2014/main" id="{C62DBC98-E8AF-45EE-88A9-6CA7546F84AE}"/>
+                </a:ext>
+              </a:extLst>
+            </p:cNvPr>
+            <p:cNvSpPr/>
+            <p:nvPr/>
+          </p:nvSpPr>
+          <p:spPr>
+            <a:xfrm>
+              <a:off x="1124832" y="2060200"/>
+              <a:ext cx="629360" cy="705661"/>
+            </a:xfrm>
+            <a:custGeom>
+              <a:avLst/>
+              <a:gdLst>
+                <a:gd name="connsiteX0" fmla="*/ 519399 w 629360"/>
+                <a:gd name="connsiteY0" fmla="*/ 152000 h 705661"/>
+                <a:gd name="connsiteX1" fmla="*/ 559889 w 629360"/>
+                <a:gd name="connsiteY1" fmla="*/ 111509 h 705661"/>
+                <a:gd name="connsiteX2" fmla="*/ 559655 w 629360"/>
+                <a:gd name="connsiteY2" fmla="*/ 98041 h 705661"/>
+                <a:gd name="connsiteX3" fmla="*/ 546421 w 629360"/>
+                <a:gd name="connsiteY3" fmla="*/ 98041 h 705661"/>
+                <a:gd name="connsiteX4" fmla="*/ 504511 w 629360"/>
+                <a:gd name="connsiteY4" fmla="*/ 139951 h 705661"/>
+                <a:gd name="connsiteX5" fmla="*/ 324555 w 629360"/>
+                <a:gd name="connsiteY5" fmla="*/ 76438 h 705661"/>
+                <a:gd name="connsiteX6" fmla="*/ 324555 w 629360"/>
+                <a:gd name="connsiteY6" fmla="*/ 19050 h 705661"/>
+                <a:gd name="connsiteX7" fmla="*/ 419805 w 629360"/>
+                <a:gd name="connsiteY7" fmla="*/ 19050 h 705661"/>
+                <a:gd name="connsiteX8" fmla="*/ 419805 w 629360"/>
+                <a:gd name="connsiteY8" fmla="*/ 0 h 705661"/>
+                <a:gd name="connsiteX9" fmla="*/ 210255 w 629360"/>
+                <a:gd name="connsiteY9" fmla="*/ 0 h 705661"/>
+                <a:gd name="connsiteX10" fmla="*/ 210255 w 629360"/>
+                <a:gd name="connsiteY10" fmla="*/ 19050 h 705661"/>
+                <a:gd name="connsiteX11" fmla="*/ 305505 w 629360"/>
+                <a:gd name="connsiteY11" fmla="*/ 19050 h 705661"/>
+                <a:gd name="connsiteX12" fmla="*/ 305505 w 629360"/>
+                <a:gd name="connsiteY12" fmla="*/ 76438 h 705661"/>
+                <a:gd name="connsiteX13" fmla="*/ 136 w 629360"/>
+                <a:gd name="connsiteY13" fmla="*/ 400157 h 705661"/>
+                <a:gd name="connsiteX14" fmla="*/ 323855 w 629360"/>
+                <a:gd name="connsiteY14" fmla="*/ 705525 h 705661"/>
+                <a:gd name="connsiteX15" fmla="*/ 629224 w 629360"/>
+                <a:gd name="connsiteY15" fmla="*/ 381807 h 705661"/>
+                <a:gd name="connsiteX16" fmla="*/ 519399 w 629360"/>
+                <a:gd name="connsiteY16" fmla="*/ 152000 h 705661"/>
+                <a:gd name="connsiteX17" fmla="*/ 315030 w 629360"/>
+                <a:gd name="connsiteY17" fmla="*/ 685800 h 705661"/>
+                <a:gd name="connsiteX18" fmla="*/ 19755 w 629360"/>
+                <a:gd name="connsiteY18" fmla="*/ 390525 h 705661"/>
+                <a:gd name="connsiteX19" fmla="*/ 315030 w 629360"/>
+                <a:gd name="connsiteY19" fmla="*/ 95250 h 705661"/>
+                <a:gd name="connsiteX20" fmla="*/ 610305 w 629360"/>
+                <a:gd name="connsiteY20" fmla="*/ 390525 h 705661"/>
+                <a:gd name="connsiteX21" fmla="*/ 315030 w 629360"/>
+                <a:gd name="connsiteY21" fmla="*/ 685800 h 705661"/>
+              </a:gdLst>
+              <a:ahLst/>
+              <a:cxnLst>
+                <a:cxn ang="0">
+                  <a:pos x="connsiteX0" y="connsiteY0"/>
+                </a:cxn>
+                <a:cxn ang="0">
+                  <a:pos x="connsiteX1" y="connsiteY1"/>
+                </a:cxn>
+                <a:cxn ang="0">
+                  <a:pos x="connsiteX2" y="connsiteY2"/>
+                </a:cxn>
+                <a:cxn ang="0">
+                  <a:pos x="connsiteX3" y="connsiteY3"/>
+                </a:cxn>
+                <a:cxn ang="0">
+                  <a:pos x="connsiteX4" y="connsiteY4"/>
+                </a:cxn>
+                <a:cxn ang="0">
+                  <a:pos x="connsiteX5" y="connsiteY5"/>
+                </a:cxn>
+                <a:cxn ang="0">
+                  <a:pos x="connsiteX6" y="connsiteY6"/>
+                </a:cxn>
+                <a:cxn ang="0">
+                  <a:pos x="connsiteX7" y="connsiteY7"/>
+                </a:cxn>
+                <a:cxn ang="0">
+                  <a:pos x="connsiteX8" y="connsiteY8"/>
+                </a:cxn>
+                <a:cxn ang="0">
+                  <a:pos x="connsiteX9" y="connsiteY9"/>
+                </a:cxn>
+                <a:cxn ang="0">
+                  <a:pos x="connsiteX10" y="connsiteY10"/>
+                </a:cxn>
+                <a:cxn ang="0">
+                  <a:pos x="connsiteX11" y="connsiteY11"/>
+                </a:cxn>
+                <a:cxn ang="0">
+                  <a:pos x="connsiteX12" y="connsiteY12"/>
+                </a:cxn>
+                <a:cxn ang="0">
+                  <a:pos x="connsiteX13" y="connsiteY13"/>
+                </a:cxn>
+                <a:cxn ang="0">
+                  <a:pos x="connsiteX14" y="connsiteY14"/>
+                </a:cxn>
+                <a:cxn ang="0">
+                  <a:pos x="connsiteX15" y="connsiteY15"/>
+                </a:cxn>
+                <a:cxn ang="0">
+                  <a:pos x="connsiteX16" y="connsiteY16"/>
+                </a:cxn>
+                <a:cxn ang="0">
+                  <a:pos x="connsiteX17" y="connsiteY17"/>
+                </a:cxn>
+                <a:cxn ang="0">
+                  <a:pos x="connsiteX18" y="connsiteY18"/>
+                </a:cxn>
+                <a:cxn ang="0">
+                  <a:pos x="connsiteX19" y="connsiteY19"/>
+                </a:cxn>
+                <a:cxn ang="0">
+                  <a:pos x="connsiteX20" y="connsiteY20"/>
+                </a:cxn>
+                <a:cxn ang="0">
+                  <a:pos x="connsiteX21" y="connsiteY21"/>
+                </a:cxn>
+              </a:cxnLst>
+              <a:rect l="l" t="t" r="r" b="b"/>
+              <a:pathLst>
+                <a:path w="629360" h="705661">
+                  <a:moveTo>
+                    <a:pt x="519399" y="152000"/>
+                  </a:moveTo>
+                  <a:lnTo>
+                    <a:pt x="559889" y="111509"/>
+                  </a:lnTo>
+                  <a:cubicBezTo>
+                    <a:pt x="563544" y="107725"/>
+                    <a:pt x="563439" y="101696"/>
+                    <a:pt x="559655" y="98041"/>
+                  </a:cubicBezTo>
+                  <a:cubicBezTo>
+                    <a:pt x="555964" y="94476"/>
+                    <a:pt x="550112" y="94476"/>
+                    <a:pt x="546421" y="98041"/>
+                  </a:cubicBezTo>
+                  <a:lnTo>
+                    <a:pt x="504511" y="139951"/>
+                  </a:lnTo>
+                  <a:cubicBezTo>
+                    <a:pt x="452611" y="100542"/>
+                    <a:pt x="389694" y="78336"/>
+                    <a:pt x="324555" y="76438"/>
+                  </a:cubicBezTo>
+                  <a:lnTo>
+                    <a:pt x="324555" y="19050"/>
+                  </a:lnTo>
+                  <a:lnTo>
+                    <a:pt x="419805" y="19050"/>
+                  </a:lnTo>
+                  <a:lnTo>
+                    <a:pt x="419805" y="0"/>
+                  </a:lnTo>
+                  <a:lnTo>
+                    <a:pt x="210255" y="0"/>
+                  </a:lnTo>
+                  <a:lnTo>
+                    <a:pt x="210255" y="19050"/>
+                  </a:lnTo>
+                  <a:lnTo>
+                    <a:pt x="305505" y="19050"/>
+                  </a:lnTo>
+                  <a:lnTo>
+                    <a:pt x="305505" y="76438"/>
+                  </a:lnTo>
+                  <a:cubicBezTo>
+                    <a:pt x="131787" y="81505"/>
+                    <a:pt x="-4931" y="226439"/>
+                    <a:pt x="136" y="400157"/>
+                  </a:cubicBezTo>
+                  <a:cubicBezTo>
+                    <a:pt x="5204" y="573875"/>
+                    <a:pt x="150138" y="710593"/>
+                    <a:pt x="323855" y="705525"/>
+                  </a:cubicBezTo>
+                  <a:cubicBezTo>
+                    <a:pt x="497573" y="700458"/>
+                    <a:pt x="634291" y="555525"/>
+                    <a:pt x="629224" y="381807"/>
+                  </a:cubicBezTo>
+                  <a:cubicBezTo>
+                    <a:pt x="626638" y="293150"/>
+                    <a:pt x="586757" y="209701"/>
+                    <a:pt x="519399" y="152000"/>
+                  </a:cubicBezTo>
+                  <a:close/>
+                  <a:moveTo>
+                    <a:pt x="315030" y="685800"/>
+                  </a:moveTo>
+                  <a:cubicBezTo>
+                    <a:pt x="151954" y="685800"/>
+                    <a:pt x="19755" y="553601"/>
+                    <a:pt x="19755" y="390525"/>
+                  </a:cubicBezTo>
+                  <a:cubicBezTo>
+                    <a:pt x="19755" y="227449"/>
+                    <a:pt x="151954" y="95250"/>
+                    <a:pt x="315030" y="95250"/>
+                  </a:cubicBezTo>
+                  <a:cubicBezTo>
+                    <a:pt x="478106" y="95250"/>
+                    <a:pt x="610305" y="227449"/>
+                    <a:pt x="610305" y="390525"/>
+                  </a:cubicBezTo>
+                  <a:cubicBezTo>
+                    <a:pt x="610121" y="553524"/>
+                    <a:pt x="478030" y="685616"/>
+                    <a:pt x="315030" y="685800"/>
+                  </a:cubicBezTo>
+                  <a:close/>
+                </a:path>
+              </a:pathLst>
+            </a:custGeom>
+            <a:solidFill>
+              <a:srgbClr val="000000"/>
+            </a:solidFill>
+            <a:ln w="9525" cap="flat">
+              <a:noFill/>
+              <a:prstDash val="solid"/>
+              <a:miter/>
+            </a:ln>
+          </p:spPr>
+          <p:txBody>
+            <a:bodyPr rtlCol="0" anchor="ctr"/>
+            <a:lstStyle/>
+            <a:p>
+              <a:endParaRPr lang="en-US"/>
+            </a:p>
+          </p:txBody>
+        </p:sp>
+        <p:sp>
+          <p:nvSpPr>
+            <p:cNvPr id="25" name="Freeform: Shape 24">
+              <a:extLst>
+                <a:ext uri="{FF2B5EF4-FFF2-40B4-BE49-F238E27FC236}">
+                  <a16:creationId xmlns:a16="http://schemas.microsoft.com/office/drawing/2014/main" id="{CED593A7-01E1-4D07-9FF8-C6017F2D6AB5}"/>
+                </a:ext>
+              </a:extLst>
+            </p:cNvPr>
+            <p:cNvSpPr/>
+            <p:nvPr/>
+          </p:nvSpPr>
+          <p:spPr>
+            <a:xfrm rot="18900000">
+              <a:off x="1215524" y="2195455"/>
+              <a:ext cx="437701" cy="475817"/>
+            </a:xfrm>
+            <a:custGeom>
+              <a:avLst/>
+              <a:gdLst>
+                <a:gd name="connsiteX0" fmla="*/ 267954 w 437701"/>
+                <a:gd name="connsiteY0" fmla="*/ 43701 h 475817"/>
+                <a:gd name="connsiteX1" fmla="*/ 263668 w 437701"/>
+                <a:gd name="connsiteY1" fmla="*/ 62265 h 475817"/>
+                <a:gd name="connsiteX2" fmla="*/ 415518 w 437701"/>
+                <a:gd name="connsiteY2" fmla="*/ 302366 h 475817"/>
+                <a:gd name="connsiteX3" fmla="*/ 175416 w 437701"/>
+                <a:gd name="connsiteY3" fmla="*/ 454217 h 475817"/>
+                <a:gd name="connsiteX4" fmla="*/ 23566 w 437701"/>
+                <a:gd name="connsiteY4" fmla="*/ 214115 h 475817"/>
+                <a:gd name="connsiteX5" fmla="*/ 208994 w 437701"/>
+                <a:gd name="connsiteY5" fmla="*/ 57636 h 475817"/>
+                <a:gd name="connsiteX6" fmla="*/ 209099 w 437701"/>
+                <a:gd name="connsiteY6" fmla="*/ 57731 h 475817"/>
+                <a:gd name="connsiteX7" fmla="*/ 209099 w 437701"/>
+                <a:gd name="connsiteY7" fmla="*/ 200977 h 475817"/>
+                <a:gd name="connsiteX8" fmla="*/ 171961 w 437701"/>
+                <a:gd name="connsiteY8" fmla="*/ 257165 h 475817"/>
+                <a:gd name="connsiteX9" fmla="*/ 228149 w 437701"/>
+                <a:gd name="connsiteY9" fmla="*/ 294303 h 475817"/>
+                <a:gd name="connsiteX10" fmla="*/ 265287 w 437701"/>
+                <a:gd name="connsiteY10" fmla="*/ 238115 h 475817"/>
+                <a:gd name="connsiteX11" fmla="*/ 228149 w 437701"/>
+                <a:gd name="connsiteY11" fmla="*/ 200977 h 475817"/>
+                <a:gd name="connsiteX12" fmla="*/ 228149 w 437701"/>
+                <a:gd name="connsiteY12" fmla="*/ 0 h 475817"/>
+                <a:gd name="connsiteX13" fmla="*/ 209099 w 437701"/>
+                <a:gd name="connsiteY13" fmla="*/ 0 h 475817"/>
+                <a:gd name="connsiteX14" fmla="*/ 209099 w 437701"/>
+                <a:gd name="connsiteY14" fmla="*/ 38338 h 475817"/>
+                <a:gd name="connsiteX15" fmla="*/ 221 w 437701"/>
+                <a:gd name="connsiteY15" fmla="*/ 266718 h 475817"/>
+                <a:gd name="connsiteX16" fmla="*/ 228601 w 437701"/>
+                <a:gd name="connsiteY16" fmla="*/ 475597 h 475817"/>
+                <a:gd name="connsiteX17" fmla="*/ 437480 w 437701"/>
+                <a:gd name="connsiteY17" fmla="*/ 247216 h 475817"/>
+                <a:gd name="connsiteX18" fmla="*/ 267954 w 437701"/>
+                <a:gd name="connsiteY18" fmla="*/ 43701 h 475817"/>
+                <a:gd name="connsiteX19" fmla="*/ 247199 w 437701"/>
+                <a:gd name="connsiteY19" fmla="*/ 247650 h 475817"/>
+                <a:gd name="connsiteX20" fmla="*/ 218624 w 437701"/>
+                <a:gd name="connsiteY20" fmla="*/ 276225 h 475817"/>
+                <a:gd name="connsiteX21" fmla="*/ 190049 w 437701"/>
+                <a:gd name="connsiteY21" fmla="*/ 247650 h 475817"/>
+                <a:gd name="connsiteX22" fmla="*/ 218624 w 437701"/>
+                <a:gd name="connsiteY22" fmla="*/ 219075 h 475817"/>
+                <a:gd name="connsiteX23" fmla="*/ 247199 w 437701"/>
+                <a:gd name="connsiteY23" fmla="*/ 247650 h 475817"/>
+              </a:gdLst>
+              <a:ahLst/>
+              <a:cxnLst>
+                <a:cxn ang="0">
+                  <a:pos x="connsiteX0" y="connsiteY0"/>
+                </a:cxn>
+                <a:cxn ang="0">
+                  <a:pos x="connsiteX1" y="connsiteY1"/>
+                </a:cxn>
+                <a:cxn ang="0">
+                  <a:pos x="connsiteX2" y="connsiteY2"/>
+                </a:cxn>
+                <a:cxn ang="0">
+                  <a:pos x="connsiteX3" y="connsiteY3"/>
+                </a:cxn>
+                <a:cxn ang="0">
+                  <a:pos x="connsiteX4" y="connsiteY4"/>
+                </a:cxn>
+                <a:cxn ang="0">
+                  <a:pos x="connsiteX5" y="connsiteY5"/>
+                </a:cxn>
+                <a:cxn ang="0">
+                  <a:pos x="connsiteX6" y="connsiteY6"/>
+                </a:cxn>
+                <a:cxn ang="0">
+                  <a:pos x="connsiteX7" y="connsiteY7"/>
+                </a:cxn>
+                <a:cxn ang="0">
+                  <a:pos x="connsiteX8" y="connsiteY8"/>
+                </a:cxn>
+                <a:cxn ang="0">
+                  <a:pos x="connsiteX9" y="connsiteY9"/>
+                </a:cxn>
+                <a:cxn ang="0">
+                  <a:pos x="connsiteX10" y="connsiteY10"/>
+                </a:cxn>
+                <a:cxn ang="0">
+                  <a:pos x="connsiteX11" y="connsiteY11"/>
+                </a:cxn>
+                <a:cxn ang="0">
+                  <a:pos x="connsiteX12" y="connsiteY12"/>
+                </a:cxn>
+                <a:cxn ang="0">
+                  <a:pos x="connsiteX13" y="connsiteY13"/>
+                </a:cxn>
+                <a:cxn ang="0">
+                  <a:pos x="connsiteX14" y="connsiteY14"/>
+                </a:cxn>
+                <a:cxn ang="0">
+                  <a:pos x="connsiteX15" y="connsiteY15"/>
+                </a:cxn>
+                <a:cxn ang="0">
+                  <a:pos x="connsiteX16" y="connsiteY16"/>
+                </a:cxn>
+                <a:cxn ang="0">
+                  <a:pos x="connsiteX17" y="connsiteY17"/>
+                </a:cxn>
+                <a:cxn ang="0">
+                  <a:pos x="connsiteX18" y="connsiteY18"/>
+                </a:cxn>
+                <a:cxn ang="0">
+                  <a:pos x="connsiteX19" y="connsiteY19"/>
+                </a:cxn>
+                <a:cxn ang="0">
+                  <a:pos x="connsiteX20" y="connsiteY20"/>
+                </a:cxn>
+                <a:cxn ang="0">
+                  <a:pos x="connsiteX21" y="connsiteY21"/>
+                </a:cxn>
+                <a:cxn ang="0">
+                  <a:pos x="connsiteX22" y="connsiteY22"/>
+                </a:cxn>
+                <a:cxn ang="0">
+                  <a:pos x="connsiteX23" y="connsiteY23"/>
+                </a:cxn>
+              </a:cxnLst>
+              <a:rect l="l" t="t" r="r" b="b"/>
+              <a:pathLst>
+                <a:path w="437701" h="475817">
+                  <a:moveTo>
+                    <a:pt x="267954" y="43701"/>
+                  </a:moveTo>
+                  <a:lnTo>
+                    <a:pt x="263668" y="62265"/>
+                  </a:lnTo>
+                  <a:cubicBezTo>
+                    <a:pt x="371902" y="86635"/>
+                    <a:pt x="439888" y="194132"/>
+                    <a:pt x="415518" y="302366"/>
+                  </a:cubicBezTo>
+                  <a:cubicBezTo>
+                    <a:pt x="391147" y="410601"/>
+                    <a:pt x="283651" y="478587"/>
+                    <a:pt x="175416" y="454217"/>
+                  </a:cubicBezTo>
+                  <a:cubicBezTo>
+                    <a:pt x="67181" y="429847"/>
+                    <a:pt x="-804" y="322350"/>
+                    <a:pt x="23566" y="214115"/>
+                  </a:cubicBezTo>
+                  <a:cubicBezTo>
+                    <a:pt x="43337" y="126303"/>
+                    <a:pt x="119108" y="62362"/>
+                    <a:pt x="208994" y="57636"/>
+                  </a:cubicBezTo>
+                  <a:cubicBezTo>
+                    <a:pt x="209048" y="57636"/>
+                    <a:pt x="209094" y="57677"/>
+                    <a:pt x="209099" y="57731"/>
+                  </a:cubicBezTo>
+                  <a:lnTo>
+                    <a:pt x="209099" y="200977"/>
+                  </a:lnTo>
+                  <a:cubicBezTo>
+                    <a:pt x="183328" y="206238"/>
+                    <a:pt x="166700" y="231394"/>
+                    <a:pt x="171961" y="257165"/>
+                  </a:cubicBezTo>
+                  <a:cubicBezTo>
+                    <a:pt x="177222" y="282936"/>
+                    <a:pt x="202378" y="299563"/>
+                    <a:pt x="228149" y="294303"/>
+                  </a:cubicBezTo>
+                  <a:cubicBezTo>
+                    <a:pt x="253920" y="289043"/>
+                    <a:pt x="270548" y="263886"/>
+                    <a:pt x="265287" y="238115"/>
+                  </a:cubicBezTo>
+                  <a:cubicBezTo>
+                    <a:pt x="261469" y="219412"/>
+                    <a:pt x="246852" y="204795"/>
+                    <a:pt x="228149" y="200977"/>
+                  </a:cubicBezTo>
+                  <a:lnTo>
+                    <a:pt x="228149" y="0"/>
+                  </a:lnTo>
+                  <a:lnTo>
+                    <a:pt x="209099" y="0"/>
+                  </a:lnTo>
+                  <a:lnTo>
+                    <a:pt x="209099" y="38338"/>
+                  </a:lnTo>
+                  <a:cubicBezTo>
+                    <a:pt x="88353" y="43724"/>
+                    <a:pt x="-5164" y="145973"/>
+                    <a:pt x="221" y="266718"/>
+                  </a:cubicBezTo>
+                  <a:cubicBezTo>
+                    <a:pt x="5607" y="387464"/>
+                    <a:pt x="107856" y="480982"/>
+                    <a:pt x="228601" y="475597"/>
+                  </a:cubicBezTo>
+                  <a:cubicBezTo>
+                    <a:pt x="349347" y="470210"/>
+                    <a:pt x="442865" y="367961"/>
+                    <a:pt x="437480" y="247216"/>
+                  </a:cubicBezTo>
+                  <a:cubicBezTo>
+                    <a:pt x="433098" y="149000"/>
+                    <a:pt x="363760" y="65760"/>
+                    <a:pt x="267954" y="43701"/>
+                  </a:cubicBezTo>
+                  <a:close/>
+                  <a:moveTo>
+                    <a:pt x="247199" y="247650"/>
+                  </a:moveTo>
+                  <a:cubicBezTo>
+                    <a:pt x="247199" y="263432"/>
+                    <a:pt x="234406" y="276225"/>
+                    <a:pt x="218624" y="276225"/>
+                  </a:cubicBezTo>
+                  <a:cubicBezTo>
+                    <a:pt x="202842" y="276225"/>
+                    <a:pt x="190049" y="263432"/>
+                    <a:pt x="190049" y="247650"/>
+                  </a:cubicBezTo>
+                  <a:cubicBezTo>
+                    <a:pt x="190049" y="231868"/>
+                    <a:pt x="202842" y="219075"/>
+                    <a:pt x="218624" y="219075"/>
+                  </a:cubicBezTo>
+                  <a:cubicBezTo>
+                    <a:pt x="234406" y="219075"/>
+                    <a:pt x="247199" y="231868"/>
+                    <a:pt x="247199" y="247650"/>
+                  </a:cubicBezTo>
+                  <a:close/>
+                </a:path>
+              </a:pathLst>
+            </a:custGeom>
+            <a:solidFill>
+              <a:srgbClr val="000000"/>
+            </a:solidFill>
+            <a:ln w="9525" cap="flat">
+              <a:noFill/>
+              <a:prstDash val="solid"/>
+              <a:miter/>
+            </a:ln>
+          </p:spPr>
+          <p:txBody>
+            <a:bodyPr rtlCol="0" anchor="ctr"/>
+            <a:lstStyle/>
+            <a:p>
+              <a:endParaRPr lang="en-US"/>
+            </a:p>
+          </p:txBody>
+        </p:sp>
+        <p:sp>
+          <p:nvSpPr>
+            <p:cNvPr id="26" name="Rectangle 25">
+              <a:extLst>
+                <a:ext uri="{FF2B5EF4-FFF2-40B4-BE49-F238E27FC236}">
+                  <a16:creationId xmlns:a16="http://schemas.microsoft.com/office/drawing/2014/main" id="{8B03E505-10CD-4D5A-9FA6-1C74FAAD714B}"/>
+                </a:ext>
+              </a:extLst>
+            </p:cNvPr>
+            <p:cNvSpPr/>
+            <p:nvPr/>
+          </p:nvSpPr>
+          <p:spPr>
+            <a:xfrm>
+              <a:off x="1320165" y="2201418"/>
+              <a:ext cx="111727" cy="93345"/>
+            </a:xfrm>
+            <a:prstGeom prst="rect">
+              <a:avLst/>
+            </a:prstGeom>
+            <a:solidFill>
+              <a:schemeClr val="bg1"/>
+            </a:solidFill>
+            <a:ln>
+              <a:solidFill>
+                <a:schemeClr val="bg1"/>
+              </a:solidFill>
+            </a:ln>
+          </p:spPr>
+          <p:style>
+            <a:lnRef idx="2">
+              <a:schemeClr val="accent1">
+                <a:shade val="50000"/>
+              </a:schemeClr>
+            </a:lnRef>
+            <a:fillRef idx="1">
+              <a:schemeClr val="accent1"/>
+            </a:fillRef>
+            <a:effectRef idx="0">
+              <a:schemeClr val="accent1"/>
+            </a:effectRef>
+            <a:fontRef idx="minor">
+              <a:schemeClr val="lt1"/>
+            </a:fontRef>
+          </p:style>
+          <p:txBody>
+            <a:bodyPr rtlCol="0" anchor="ctr"/>
+            <a:lstStyle/>
+            <a:p>
+              <a:pPr algn="ctr"/>
+              <a:endParaRPr lang="en-US"/>
+            </a:p>
+          </p:txBody>
+        </p:sp>
+      </p:grpSp>
+    </p:spTree>
+    <p:extLst>
+      <p:ext uri="{BB962C8B-B14F-4D97-AF65-F5344CB8AC3E}">
+        <p14:creationId xmlns:p14="http://schemas.microsoft.com/office/powerpoint/2010/main" val="2154472295"/>
+      </p:ext>
+    </p:extLst>
+  </p:cSld>
+  <p:clrMapOvr>
+    <a:masterClrMapping/>
+  </p:clrMapOvr>
+</p:sld>
+</file>
+
+<file path=ppt/slides/slide4.xml><?xml version="1.0" encoding="utf-8"?>
+<p:sld xmlns:a="http://schemas.openxmlformats.org/drawingml/2006/main" xmlns:r="http://schemas.openxmlformats.org/officeDocument/2006/relationships" xmlns:p="http://schemas.openxmlformats.org/presentationml/2006/main">
+  <p:cSld>
+    <p:spTree>
+      <p:nvGrpSpPr>
+        <p:cNvPr id="1" name=""/>
+        <p:cNvGrpSpPr/>
+        <p:nvPr/>
+      </p:nvGrpSpPr>
+      <p:grpSpPr>
+        <a:xfrm>
+          <a:off x="0" y="0"/>
+          <a:ext cx="0" cy="0"/>
+          <a:chOff x="0" y="0"/>
+          <a:chExt cx="0" cy="0"/>
+        </a:xfrm>
+      </p:grpSpPr>
+      <p:grpSp>
+        <p:nvGrpSpPr>
+          <p:cNvPr id="2" name="Group 1">
+            <a:extLst>
+              <a:ext uri="{FF2B5EF4-FFF2-40B4-BE49-F238E27FC236}">
+                <a16:creationId xmlns:a16="http://schemas.microsoft.com/office/drawing/2014/main" id="{86C49FA6-7D63-466E-BCEA-65F2DA95813F}"/>
+              </a:ext>
+            </a:extLst>
+          </p:cNvPr>
+          <p:cNvGrpSpPr/>
+          <p:nvPr/>
+        </p:nvGrpSpPr>
+        <p:grpSpPr>
+          <a:xfrm>
+            <a:off x="849630" y="762806"/>
+            <a:ext cx="914400" cy="914400"/>
+            <a:chOff x="849630" y="762806"/>
+            <a:chExt cx="914400" cy="914400"/>
+          </a:xfrm>
+        </p:grpSpPr>
+        <p:sp>
+          <p:nvSpPr>
+            <p:cNvPr id="30" name="Oval 29">
+              <a:extLst>
+                <a:ext uri="{FF2B5EF4-FFF2-40B4-BE49-F238E27FC236}">
+                  <a16:creationId xmlns:a16="http://schemas.microsoft.com/office/drawing/2014/main" id="{7C71FA49-B870-41EB-A9A7-C5FEE0D4BD97}"/>
+                </a:ext>
+              </a:extLst>
+            </p:cNvPr>
+            <p:cNvSpPr/>
+            <p:nvPr/>
+          </p:nvSpPr>
+          <p:spPr>
+            <a:xfrm>
+              <a:off x="995828" y="959846"/>
+              <a:ext cx="619346" cy="619346"/>
+            </a:xfrm>
+            <a:prstGeom prst="ellipse">
+              <a:avLst/>
+            </a:prstGeom>
+            <a:solidFill>
+              <a:schemeClr val="bg1"/>
+            </a:solidFill>
+            <a:ln>
+              <a:noFill/>
+            </a:ln>
+          </p:spPr>
+          <p:style>
+            <a:lnRef idx="2">
+              <a:schemeClr val="accent1">
+                <a:shade val="50000"/>
+              </a:schemeClr>
+            </a:lnRef>
+            <a:fillRef idx="1">
+              <a:schemeClr val="accent1"/>
+            </a:fillRef>
+            <a:effectRef idx="0">
+              <a:schemeClr val="accent1"/>
+            </a:effectRef>
+            <a:fontRef idx="minor">
+              <a:schemeClr val="lt1"/>
+            </a:fontRef>
+          </p:style>
+          <p:txBody>
+            <a:bodyPr rtlCol="0" anchor="ctr"/>
+            <a:lstStyle/>
+            <a:p>
+              <a:pPr algn="ctr"/>
+              <a:endParaRPr lang="en-US"/>
+            </a:p>
+          </p:txBody>
+        </p:sp>
+        <p:pic>
+          <p:nvPicPr>
+            <p:cNvPr id="15" name="Graphic 14" descr="Stopwatch 33% outline">
+              <a:extLst>
+                <a:ext uri="{FF2B5EF4-FFF2-40B4-BE49-F238E27FC236}">
+                  <a16:creationId xmlns:a16="http://schemas.microsoft.com/office/drawing/2014/main" id="{E2474B18-BDEF-4D85-970C-2BA5D0C57559}"/>
+                </a:ext>
+              </a:extLst>
+            </p:cNvPr>
+            <p:cNvPicPr>
+              <a:picLocks noChangeAspect="1"/>
+            </p:cNvPicPr>
+            <p:nvPr/>
+          </p:nvPicPr>
+          <p:blipFill>
+            <a:blip r:embed="rId2">
+              <a:extLst>
+                <a:ext uri="{28A0092B-C50C-407E-A947-70E740481C1C}">
+                  <a14:useLocalDpi xmlns:a14="http://schemas.microsoft.com/office/drawing/2010/main" val="0"/>
+                </a:ext>
+                <a:ext uri="{96DAC541-7B7A-43D3-8B79-37D633B846F1}">
+                  <asvg:svgBlip xmlns:asvg="http://schemas.microsoft.com/office/drawing/2016/SVG/main" r:embed="rId3"/>
+                </a:ext>
+              </a:extLst>
+            </a:blip>
+            <a:stretch>
+              <a:fillRect/>
+            </a:stretch>
+          </p:blipFill>
+          <p:spPr>
+            <a:xfrm>
+              <a:off x="849630" y="762806"/>
+              <a:ext cx="914400" cy="914400"/>
+            </a:xfrm>
+            <a:prstGeom prst="rect">
+              <a:avLst/>
+            </a:prstGeom>
+          </p:spPr>
+        </p:pic>
+      </p:grpSp>
+    </p:spTree>
+    <p:extLst>
+      <p:ext uri="{BB962C8B-B14F-4D97-AF65-F5344CB8AC3E}">
+        <p14:creationId xmlns:p14="http://schemas.microsoft.com/office/powerpoint/2010/main" val="2985629597"/>
+      </p:ext>
+    </p:extLst>
+  </p:cSld>
+  <p:clrMapOvr>
+    <a:masterClrMapping/>
+  </p:clrMapOvr>
+</p:sld>
+</file>
+
+<file path=ppt/slides/slide5.xml><?xml version="1.0" encoding="utf-8"?>
+<p:sld xmlns:a="http://schemas.openxmlformats.org/drawingml/2006/main" xmlns:r="http://schemas.openxmlformats.org/officeDocument/2006/relationships" xmlns:p="http://schemas.openxmlformats.org/presentationml/2006/main">
+  <p:cSld>
     <p:bg>
       <p:bgPr>
         <a:solidFill>
@@ -3177,7 +6126,7 @@
 </p:sld>
 </file>
 
-<file path=ppt/slides/slide2.xml><?xml version="1.0" encoding="utf-8"?>
+<file path=ppt/slides/slide6.xml><?xml version="1.0" encoding="utf-8"?>
 <p:sld xmlns:a="http://schemas.openxmlformats.org/drawingml/2006/main" xmlns:r="http://schemas.openxmlformats.org/officeDocument/2006/relationships" xmlns:p="http://schemas.openxmlformats.org/presentationml/2006/main">
   <p:cSld>
     <p:bg>
@@ -3283,7 +6232,7 @@
 </p:sld>
 </file>
 
-<file path=ppt/slides/slide3.xml><?xml version="1.0" encoding="utf-8"?>
+<file path=ppt/slides/slide7.xml><?xml version="1.0" encoding="utf-8"?>
 <p:sld xmlns:a="http://schemas.openxmlformats.org/drawingml/2006/main" xmlns:r="http://schemas.openxmlformats.org/officeDocument/2006/relationships" xmlns:p="http://schemas.openxmlformats.org/presentationml/2006/main">
   <p:cSld>
     <p:bg>
@@ -3602,7 +6551,7 @@
 </p:sld>
 </file>
 
-<file path=ppt/slides/slide4.xml><?xml version="1.0" encoding="utf-8"?>
+<file path=ppt/slides/slide8.xml><?xml version="1.0" encoding="utf-8"?>
 <p:sld xmlns:a="http://schemas.openxmlformats.org/drawingml/2006/main" xmlns:r="http://schemas.openxmlformats.org/officeDocument/2006/relationships" xmlns:p="http://schemas.openxmlformats.org/presentationml/2006/main">
   <p:cSld>
     <p:bg>
@@ -3921,7 +6870,7 @@
 </p:sld>
 </file>
 
-<file path=ppt/slides/slide5.xml><?xml version="1.0" encoding="utf-8"?>
+<file path=ppt/slides/slide9.xml><?xml version="1.0" encoding="utf-8"?>
 <p:sld xmlns:a="http://schemas.openxmlformats.org/drawingml/2006/main" xmlns:r="http://schemas.openxmlformats.org/officeDocument/2006/relationships" xmlns:p="http://schemas.openxmlformats.org/presentationml/2006/main">
   <p:cSld>
     <p:bg>
@@ -4167,516 +7116,6 @@
     <p:extLst>
       <p:ext uri="{BB962C8B-B14F-4D97-AF65-F5344CB8AC3E}">
         <p14:creationId xmlns:p14="http://schemas.microsoft.com/office/powerpoint/2010/main" val="2509688378"/>
-      </p:ext>
-    </p:extLst>
-  </p:cSld>
-  <p:clrMapOvr>
-    <a:masterClrMapping/>
-  </p:clrMapOvr>
-</p:sld>
-</file>
-
-<file path=ppt/slides/slide6.xml><?xml version="1.0" encoding="utf-8"?>
-<p:sld xmlns:a="http://schemas.openxmlformats.org/drawingml/2006/main" xmlns:r="http://schemas.openxmlformats.org/officeDocument/2006/relationships" xmlns:p="http://schemas.openxmlformats.org/presentationml/2006/main">
-  <p:cSld>
-    <p:bg>
-      <p:bgPr>
-        <a:solidFill>
-          <a:schemeClr val="tx1">
-            <a:alpha val="0"/>
-          </a:schemeClr>
-        </a:solidFill>
-        <a:effectLst/>
-      </p:bgPr>
-    </p:bg>
-    <p:spTree>
-      <p:nvGrpSpPr>
-        <p:cNvPr id="1" name=""/>
-        <p:cNvGrpSpPr/>
-        <p:nvPr/>
-      </p:nvGrpSpPr>
-      <p:grpSpPr>
-        <a:xfrm>
-          <a:off x="0" y="0"/>
-          <a:ext cx="0" cy="0"/>
-          <a:chOff x="0" y="0"/>
-          <a:chExt cx="0" cy="0"/>
-        </a:xfrm>
-      </p:grpSpPr>
-      <p:grpSp>
-        <p:nvGrpSpPr>
-          <p:cNvPr id="8" name="Group 7">
-            <a:extLst>
-              <a:ext uri="{FF2B5EF4-FFF2-40B4-BE49-F238E27FC236}">
-                <a16:creationId xmlns:a16="http://schemas.microsoft.com/office/drawing/2014/main" id="{378C68F5-E51C-433C-BFFC-351DD7D6E706}"/>
-              </a:ext>
-            </a:extLst>
-          </p:cNvPr>
-          <p:cNvGrpSpPr/>
-          <p:nvPr/>
-        </p:nvGrpSpPr>
-        <p:grpSpPr>
-          <a:xfrm>
-            <a:off x="528236" y="829072"/>
-            <a:ext cx="1823250" cy="1221580"/>
-            <a:chOff x="528236" y="829072"/>
-            <a:chExt cx="1823250" cy="1221580"/>
-          </a:xfrm>
-        </p:grpSpPr>
-        <p:sp>
-          <p:nvSpPr>
-            <p:cNvPr id="3" name="Flowchart: Decision 2">
-              <a:extLst>
-                <a:ext uri="{FF2B5EF4-FFF2-40B4-BE49-F238E27FC236}">
-                  <a16:creationId xmlns:a16="http://schemas.microsoft.com/office/drawing/2014/main" id="{5BAD1E78-63E0-4977-8F17-A4791A6841AC}"/>
-                </a:ext>
-              </a:extLst>
-            </p:cNvPr>
-            <p:cNvSpPr/>
-            <p:nvPr/>
-          </p:nvSpPr>
-          <p:spPr>
-            <a:xfrm>
-              <a:off x="1439861" y="1439863"/>
-              <a:ext cx="911625" cy="610789"/>
-            </a:xfrm>
-            <a:prstGeom prst="flowChartDecision">
-              <a:avLst/>
-            </a:prstGeom>
-            <a:noFill/>
-            <a:ln>
-              <a:solidFill>
-                <a:schemeClr val="bg1">
-                  <a:lumMod val="95000"/>
-                </a:schemeClr>
-              </a:solidFill>
-            </a:ln>
-          </p:spPr>
-          <p:style>
-            <a:lnRef idx="2">
-              <a:schemeClr val="accent1">
-                <a:shade val="50000"/>
-              </a:schemeClr>
-            </a:lnRef>
-            <a:fillRef idx="1">
-              <a:schemeClr val="accent1"/>
-            </a:fillRef>
-            <a:effectRef idx="0">
-              <a:schemeClr val="accent1"/>
-            </a:effectRef>
-            <a:fontRef idx="minor">
-              <a:schemeClr val="lt1"/>
-            </a:fontRef>
-          </p:style>
-          <p:txBody>
-            <a:bodyPr rtlCol="0" anchor="t"/>
-            <a:lstStyle/>
-            <a:p>
-              <a:pPr algn="ctr"/>
-              <a:r>
-                <a:rPr lang="en-US" sz="2239" dirty="0">
-                  <a:solidFill>
-                    <a:schemeClr val="bg1">
-                      <a:lumMod val="95000"/>
-                    </a:schemeClr>
-                  </a:solidFill>
-                  <a:latin typeface="Lobster" panose="00000500000000000000" pitchFamily="50" charset="0"/>
-                </a:rPr>
-                <a:t>1</a:t>
-              </a:r>
-            </a:p>
-          </p:txBody>
-        </p:sp>
-        <p:sp>
-          <p:nvSpPr>
-            <p:cNvPr id="5" name="Flowchart: Decision 4">
-              <a:extLst>
-                <a:ext uri="{FF2B5EF4-FFF2-40B4-BE49-F238E27FC236}">
-                  <a16:creationId xmlns:a16="http://schemas.microsoft.com/office/drawing/2014/main" id="{B3970CEB-F703-423F-8C89-9AB17D04CD98}"/>
-                </a:ext>
-              </a:extLst>
-            </p:cNvPr>
-            <p:cNvSpPr/>
-            <p:nvPr/>
-          </p:nvSpPr>
-          <p:spPr>
-            <a:xfrm>
-              <a:off x="984048" y="1138894"/>
-              <a:ext cx="911625" cy="610789"/>
-            </a:xfrm>
-            <a:prstGeom prst="flowChartDecision">
-              <a:avLst/>
-            </a:prstGeom>
-            <a:noFill/>
-            <a:ln>
-              <a:solidFill>
-                <a:schemeClr val="bg1">
-                  <a:lumMod val="95000"/>
-                </a:schemeClr>
-              </a:solidFill>
-            </a:ln>
-          </p:spPr>
-          <p:style>
-            <a:lnRef idx="2">
-              <a:schemeClr val="accent1">
-                <a:shade val="50000"/>
-              </a:schemeClr>
-            </a:lnRef>
-            <a:fillRef idx="1">
-              <a:schemeClr val="accent1"/>
-            </a:fillRef>
-            <a:effectRef idx="0">
-              <a:schemeClr val="accent1"/>
-            </a:effectRef>
-            <a:fontRef idx="minor">
-              <a:schemeClr val="lt1"/>
-            </a:fontRef>
-          </p:style>
-          <p:txBody>
-            <a:bodyPr rtlCol="0" anchor="t"/>
-            <a:lstStyle/>
-            <a:p>
-              <a:pPr algn="ctr"/>
-              <a:r>
-                <a:rPr lang="en-US" sz="2239" dirty="0">
-                  <a:solidFill>
-                    <a:schemeClr val="bg1">
-                      <a:lumMod val="95000"/>
-                    </a:schemeClr>
-                  </a:solidFill>
-                  <a:latin typeface="Lobster" panose="00000500000000000000" pitchFamily="50" charset="0"/>
-                </a:rPr>
-                <a:t>2</a:t>
-              </a:r>
-            </a:p>
-          </p:txBody>
-        </p:sp>
-        <p:sp>
-          <p:nvSpPr>
-            <p:cNvPr id="7" name="Flowchart: Decision 6">
-              <a:extLst>
-                <a:ext uri="{FF2B5EF4-FFF2-40B4-BE49-F238E27FC236}">
-                  <a16:creationId xmlns:a16="http://schemas.microsoft.com/office/drawing/2014/main" id="{440E7DE8-FB3D-4DD7-92CC-3E17CC85C084}"/>
-                </a:ext>
-              </a:extLst>
-            </p:cNvPr>
-            <p:cNvSpPr/>
-            <p:nvPr/>
-          </p:nvSpPr>
-          <p:spPr>
-            <a:xfrm>
-              <a:off x="528236" y="829072"/>
-              <a:ext cx="911625" cy="610789"/>
-            </a:xfrm>
-            <a:prstGeom prst="flowChartDecision">
-              <a:avLst/>
-            </a:prstGeom>
-            <a:solidFill>
-              <a:schemeClr val="bg1">
-                <a:lumMod val="95000"/>
-              </a:schemeClr>
-            </a:solidFill>
-            <a:ln>
-              <a:solidFill>
-                <a:schemeClr val="bg1">
-                  <a:lumMod val="95000"/>
-                </a:schemeClr>
-              </a:solidFill>
-            </a:ln>
-          </p:spPr>
-          <p:style>
-            <a:lnRef idx="2">
-              <a:schemeClr val="accent1">
-                <a:shade val="50000"/>
-              </a:schemeClr>
-            </a:lnRef>
-            <a:fillRef idx="1">
-              <a:schemeClr val="accent1"/>
-            </a:fillRef>
-            <a:effectRef idx="0">
-              <a:schemeClr val="accent1"/>
-            </a:effectRef>
-            <a:fontRef idx="minor">
-              <a:schemeClr val="lt1"/>
-            </a:fontRef>
-          </p:style>
-          <p:txBody>
-            <a:bodyPr rtlCol="0" anchor="t"/>
-            <a:lstStyle/>
-            <a:p>
-              <a:pPr algn="ctr"/>
-              <a:r>
-                <a:rPr lang="en-US" sz="2239" dirty="0">
-                  <a:solidFill>
-                    <a:schemeClr val="tx1"/>
-                  </a:solidFill>
-                  <a:latin typeface="Lobster" panose="00000500000000000000" pitchFamily="50" charset="0"/>
-                </a:rPr>
-                <a:t>3</a:t>
-              </a:r>
-            </a:p>
-          </p:txBody>
-        </p:sp>
-      </p:grpSp>
-    </p:spTree>
-    <p:extLst>
-      <p:ext uri="{BB962C8B-B14F-4D97-AF65-F5344CB8AC3E}">
-        <p14:creationId xmlns:p14="http://schemas.microsoft.com/office/powerpoint/2010/main" val="3802208767"/>
-      </p:ext>
-    </p:extLst>
-  </p:cSld>
-  <p:clrMapOvr>
-    <a:masterClrMapping/>
-  </p:clrMapOvr>
-</p:sld>
-</file>
-
-<file path=ppt/slides/slide7.xml><?xml version="1.0" encoding="utf-8"?>
-<p:sld xmlns:a="http://schemas.openxmlformats.org/drawingml/2006/main" xmlns:r="http://schemas.openxmlformats.org/officeDocument/2006/relationships" xmlns:p="http://schemas.openxmlformats.org/presentationml/2006/main">
-  <p:cSld>
-    <p:bg>
-      <p:bgPr>
-        <a:solidFill>
-          <a:schemeClr val="tx1">
-            <a:alpha val="0"/>
-          </a:schemeClr>
-        </a:solidFill>
-        <a:effectLst/>
-      </p:bgPr>
-    </p:bg>
-    <p:spTree>
-      <p:nvGrpSpPr>
-        <p:cNvPr id="1" name=""/>
-        <p:cNvGrpSpPr/>
-        <p:nvPr/>
-      </p:nvGrpSpPr>
-      <p:grpSpPr>
-        <a:xfrm>
-          <a:off x="0" y="0"/>
-          <a:ext cx="0" cy="0"/>
-          <a:chOff x="0" y="0"/>
-          <a:chExt cx="0" cy="0"/>
-        </a:xfrm>
-      </p:grpSpPr>
-      <p:grpSp>
-        <p:nvGrpSpPr>
-          <p:cNvPr id="8" name="Group 7">
-            <a:extLst>
-              <a:ext uri="{FF2B5EF4-FFF2-40B4-BE49-F238E27FC236}">
-                <a16:creationId xmlns:a16="http://schemas.microsoft.com/office/drawing/2014/main" id="{378C68F5-E51C-433C-BFFC-351DD7D6E706}"/>
-              </a:ext>
-            </a:extLst>
-          </p:cNvPr>
-          <p:cNvGrpSpPr/>
-          <p:nvPr/>
-        </p:nvGrpSpPr>
-        <p:grpSpPr>
-          <a:xfrm>
-            <a:off x="528235" y="833499"/>
-            <a:ext cx="1823251" cy="1217153"/>
-            <a:chOff x="528235" y="833499"/>
-            <a:chExt cx="1823251" cy="1217153"/>
-          </a:xfrm>
-        </p:grpSpPr>
-        <p:sp>
-          <p:nvSpPr>
-            <p:cNvPr id="3" name="Flowchart: Decision 2">
-              <a:extLst>
-                <a:ext uri="{FF2B5EF4-FFF2-40B4-BE49-F238E27FC236}">
-                  <a16:creationId xmlns:a16="http://schemas.microsoft.com/office/drawing/2014/main" id="{5BAD1E78-63E0-4977-8F17-A4791A6841AC}"/>
-                </a:ext>
-              </a:extLst>
-            </p:cNvPr>
-            <p:cNvSpPr/>
-            <p:nvPr/>
-          </p:nvSpPr>
-          <p:spPr>
-            <a:xfrm>
-              <a:off x="1439861" y="833499"/>
-              <a:ext cx="911625" cy="610789"/>
-            </a:xfrm>
-            <a:prstGeom prst="flowChartDecision">
-              <a:avLst/>
-            </a:prstGeom>
-            <a:noFill/>
-            <a:ln>
-              <a:solidFill>
-                <a:schemeClr val="bg1">
-                  <a:lumMod val="95000"/>
-                </a:schemeClr>
-              </a:solidFill>
-            </a:ln>
-          </p:spPr>
-          <p:style>
-            <a:lnRef idx="2">
-              <a:schemeClr val="accent1">
-                <a:shade val="50000"/>
-              </a:schemeClr>
-            </a:lnRef>
-            <a:fillRef idx="1">
-              <a:schemeClr val="accent1"/>
-            </a:fillRef>
-            <a:effectRef idx="0">
-              <a:schemeClr val="accent1"/>
-            </a:effectRef>
-            <a:fontRef idx="minor">
-              <a:schemeClr val="lt1"/>
-            </a:fontRef>
-          </p:style>
-          <p:txBody>
-            <a:bodyPr rtlCol="0" anchor="t"/>
-            <a:lstStyle/>
-            <a:p>
-              <a:pPr algn="ctr"/>
-              <a:r>
-                <a:rPr lang="en-US" sz="2239" dirty="0">
-                  <a:solidFill>
-                    <a:schemeClr val="bg1">
-                      <a:lumMod val="95000"/>
-                    </a:schemeClr>
-                  </a:solidFill>
-                  <a:latin typeface="Lobster" panose="00000500000000000000" pitchFamily="50" charset="0"/>
-                </a:rPr>
-                <a:t>1</a:t>
-              </a:r>
-            </a:p>
-          </p:txBody>
-        </p:sp>
-        <p:sp>
-          <p:nvSpPr>
-            <p:cNvPr id="5" name="Flowchart: Decision 4">
-              <a:extLst>
-                <a:ext uri="{FF2B5EF4-FFF2-40B4-BE49-F238E27FC236}">
-                  <a16:creationId xmlns:a16="http://schemas.microsoft.com/office/drawing/2014/main" id="{B3970CEB-F703-423F-8C89-9AB17D04CD98}"/>
-                </a:ext>
-              </a:extLst>
-            </p:cNvPr>
-            <p:cNvSpPr/>
-            <p:nvPr/>
-          </p:nvSpPr>
-          <p:spPr>
-            <a:xfrm>
-              <a:off x="984048" y="1138894"/>
-              <a:ext cx="911625" cy="610789"/>
-            </a:xfrm>
-            <a:prstGeom prst="flowChartDecision">
-              <a:avLst/>
-            </a:prstGeom>
-            <a:noFill/>
-            <a:ln>
-              <a:solidFill>
-                <a:schemeClr val="bg1">
-                  <a:lumMod val="95000"/>
-                </a:schemeClr>
-              </a:solidFill>
-            </a:ln>
-          </p:spPr>
-          <p:style>
-            <a:lnRef idx="2">
-              <a:schemeClr val="accent1">
-                <a:shade val="50000"/>
-              </a:schemeClr>
-            </a:lnRef>
-            <a:fillRef idx="1">
-              <a:schemeClr val="accent1"/>
-            </a:fillRef>
-            <a:effectRef idx="0">
-              <a:schemeClr val="accent1"/>
-            </a:effectRef>
-            <a:fontRef idx="minor">
-              <a:schemeClr val="lt1"/>
-            </a:fontRef>
-          </p:style>
-          <p:txBody>
-            <a:bodyPr rtlCol="0" anchor="t"/>
-            <a:lstStyle/>
-            <a:p>
-              <a:pPr algn="ctr"/>
-              <a:r>
-                <a:rPr lang="en-US" sz="2239" dirty="0">
-                  <a:solidFill>
-                    <a:schemeClr val="bg1">
-                      <a:lumMod val="95000"/>
-                    </a:schemeClr>
-                  </a:solidFill>
-                  <a:latin typeface="Lobster" panose="00000500000000000000" pitchFamily="50" charset="0"/>
-                </a:rPr>
-                <a:t>2</a:t>
-              </a:r>
-            </a:p>
-          </p:txBody>
-        </p:sp>
-        <p:sp>
-          <p:nvSpPr>
-            <p:cNvPr id="7" name="Flowchart: Decision 6">
-              <a:extLst>
-                <a:ext uri="{FF2B5EF4-FFF2-40B4-BE49-F238E27FC236}">
-                  <a16:creationId xmlns:a16="http://schemas.microsoft.com/office/drawing/2014/main" id="{440E7DE8-FB3D-4DD7-92CC-3E17CC85C084}"/>
-                </a:ext>
-              </a:extLst>
-            </p:cNvPr>
-            <p:cNvSpPr/>
-            <p:nvPr/>
-          </p:nvSpPr>
-          <p:spPr>
-            <a:xfrm>
-              <a:off x="528235" y="1439863"/>
-              <a:ext cx="911625" cy="610789"/>
-            </a:xfrm>
-            <a:prstGeom prst="flowChartDecision">
-              <a:avLst/>
-            </a:prstGeom>
-            <a:solidFill>
-              <a:schemeClr val="bg1">
-                <a:lumMod val="95000"/>
-              </a:schemeClr>
-            </a:solidFill>
-            <a:ln>
-              <a:solidFill>
-                <a:schemeClr val="bg1">
-                  <a:lumMod val="95000"/>
-                </a:schemeClr>
-              </a:solidFill>
-            </a:ln>
-          </p:spPr>
-          <p:style>
-            <a:lnRef idx="2">
-              <a:schemeClr val="accent1">
-                <a:shade val="50000"/>
-              </a:schemeClr>
-            </a:lnRef>
-            <a:fillRef idx="1">
-              <a:schemeClr val="accent1"/>
-            </a:fillRef>
-            <a:effectRef idx="0">
-              <a:schemeClr val="accent1"/>
-            </a:effectRef>
-            <a:fontRef idx="minor">
-              <a:schemeClr val="lt1"/>
-            </a:fontRef>
-          </p:style>
-          <p:txBody>
-            <a:bodyPr rtlCol="0" anchor="t"/>
-            <a:lstStyle/>
-            <a:p>
-              <a:pPr algn="ctr"/>
-              <a:r>
-                <a:rPr lang="en-US" sz="2239" dirty="0">
-                  <a:solidFill>
-                    <a:schemeClr val="tx1"/>
-                  </a:solidFill>
-                  <a:latin typeface="Lobster" panose="00000500000000000000" pitchFamily="50" charset="0"/>
-                </a:rPr>
-                <a:t>3</a:t>
-              </a:r>
-            </a:p>
-          </p:txBody>
-        </p:sp>
-      </p:grpSp>
-    </p:spTree>
-    <p:extLst>
-      <p:ext uri="{BB962C8B-B14F-4D97-AF65-F5344CB8AC3E}">
-        <p14:creationId xmlns:p14="http://schemas.microsoft.com/office/powerpoint/2010/main" val="2303702286"/>
       </p:ext>
     </p:extLst>
   </p:cSld>

</xml_diff>